<commit_message>
change the input file remove distance
</commit_message>
<xml_diff>
--- a/documentation of FYST Holo/plots_optics.pptx
+++ b/documentation of FYST Holo/plots_optics.pptx
@@ -4,8 +4,12 @@
   <p:sldMasterIdLst>
     <p:sldMasterId id="2147483648" r:id="rId1"/>
   </p:sldMasterIdLst>
+  <p:notesMasterIdLst>
+    <p:notesMasterId r:id="rId4"/>
+  </p:notesMasterIdLst>
   <p:sldIdLst>
     <p:sldId id="256" r:id="rId2"/>
+    <p:sldId id="257" r:id="rId3"/>
   </p:sldIdLst>
   <p:sldSz cx="12192000" cy="6858000"/>
   <p:notesSz cx="6858000" cy="9144000"/>
@@ -112,6 +116,440 @@
 </p:presentation>
 </file>
 
+<file path=ppt/notesMasters/notesMaster1.xml><?xml version="1.0" encoding="utf-8"?>
+<p:notesMaster xmlns:a="http://schemas.openxmlformats.org/drawingml/2006/main" xmlns:r="http://schemas.openxmlformats.org/officeDocument/2006/relationships" xmlns:p="http://schemas.openxmlformats.org/presentationml/2006/main">
+  <p:cSld>
+    <p:bg>
+      <p:bgRef idx="1001">
+        <a:schemeClr val="bg1"/>
+      </p:bgRef>
+    </p:bg>
+    <p:spTree>
+      <p:nvGrpSpPr>
+        <p:cNvPr id="1" name=""/>
+        <p:cNvGrpSpPr/>
+        <p:nvPr/>
+      </p:nvGrpSpPr>
+      <p:grpSpPr>
+        <a:xfrm>
+          <a:off x="0" y="0"/>
+          <a:ext cx="0" cy="0"/>
+          <a:chOff x="0" y="0"/>
+          <a:chExt cx="0" cy="0"/>
+        </a:xfrm>
+      </p:grpSpPr>
+      <p:sp>
+        <p:nvSpPr>
+          <p:cNvPr id="2" name="Header Placeholder 1"/>
+          <p:cNvSpPr>
+            <a:spLocks noGrp="1"/>
+          </p:cNvSpPr>
+          <p:nvPr>
+            <p:ph type="hdr" sz="quarter"/>
+          </p:nvPr>
+        </p:nvSpPr>
+        <p:spPr>
+          <a:xfrm>
+            <a:off x="0" y="0"/>
+            <a:ext cx="2971800" cy="458788"/>
+          </a:xfrm>
+          <a:prstGeom prst="rect">
+            <a:avLst/>
+          </a:prstGeom>
+        </p:spPr>
+        <p:txBody>
+          <a:bodyPr vert="horz" lIns="91440" tIns="45720" rIns="91440" bIns="45720" rtlCol="0"/>
+          <a:lstStyle>
+            <a:lvl1pPr algn="l">
+              <a:defRPr sz="1200"/>
+            </a:lvl1pPr>
+          </a:lstStyle>
+          <a:p>
+            <a:endParaRPr lang="LID4096"/>
+          </a:p>
+        </p:txBody>
+      </p:sp>
+      <p:sp>
+        <p:nvSpPr>
+          <p:cNvPr id="3" name="Date Placeholder 2"/>
+          <p:cNvSpPr>
+            <a:spLocks noGrp="1"/>
+          </p:cNvSpPr>
+          <p:nvPr>
+            <p:ph type="dt" idx="1"/>
+          </p:nvPr>
+        </p:nvSpPr>
+        <p:spPr>
+          <a:xfrm>
+            <a:off x="3884613" y="0"/>
+            <a:ext cx="2971800" cy="458788"/>
+          </a:xfrm>
+          <a:prstGeom prst="rect">
+            <a:avLst/>
+          </a:prstGeom>
+        </p:spPr>
+        <p:txBody>
+          <a:bodyPr vert="horz" lIns="91440" tIns="45720" rIns="91440" bIns="45720" rtlCol="0"/>
+          <a:lstStyle>
+            <a:lvl1pPr algn="r">
+              <a:defRPr sz="1200"/>
+            </a:lvl1pPr>
+          </a:lstStyle>
+          <a:p>
+            <a:fld id="{2987C5A2-A4F2-497D-B6B6-58AAD9365E21}" type="datetimeFigureOut">
+              <a:rPr lang="LID4096" smtClean="0"/>
+              <a:t>01/28/2024</a:t>
+            </a:fld>
+            <a:endParaRPr lang="LID4096"/>
+          </a:p>
+        </p:txBody>
+      </p:sp>
+      <p:sp>
+        <p:nvSpPr>
+          <p:cNvPr id="4" name="Slide Image Placeholder 3"/>
+          <p:cNvSpPr>
+            <a:spLocks noGrp="1" noRot="1" noChangeAspect="1"/>
+          </p:cNvSpPr>
+          <p:nvPr>
+            <p:ph type="sldImg" idx="2"/>
+          </p:nvPr>
+        </p:nvSpPr>
+        <p:spPr>
+          <a:xfrm>
+            <a:off x="685800" y="1143000"/>
+            <a:ext cx="5486400" cy="3086100"/>
+          </a:xfrm>
+          <a:prstGeom prst="rect">
+            <a:avLst/>
+          </a:prstGeom>
+          <a:noFill/>
+          <a:ln w="12700">
+            <a:solidFill>
+              <a:prstClr val="black"/>
+            </a:solidFill>
+          </a:ln>
+        </p:spPr>
+        <p:txBody>
+          <a:bodyPr vert="horz" lIns="91440" tIns="45720" rIns="91440" bIns="45720" rtlCol="0" anchor="ctr"/>
+          <a:lstStyle/>
+          <a:p>
+            <a:endParaRPr lang="LID4096"/>
+          </a:p>
+        </p:txBody>
+      </p:sp>
+      <p:sp>
+        <p:nvSpPr>
+          <p:cNvPr id="5" name="Notes Placeholder 4"/>
+          <p:cNvSpPr>
+            <a:spLocks noGrp="1"/>
+          </p:cNvSpPr>
+          <p:nvPr>
+            <p:ph type="body" sz="quarter" idx="3"/>
+          </p:nvPr>
+        </p:nvSpPr>
+        <p:spPr>
+          <a:xfrm>
+            <a:off x="685800" y="4400550"/>
+            <a:ext cx="5486400" cy="3600450"/>
+          </a:xfrm>
+          <a:prstGeom prst="rect">
+            <a:avLst/>
+          </a:prstGeom>
+        </p:spPr>
+        <p:txBody>
+          <a:bodyPr vert="horz" lIns="91440" tIns="45720" rIns="91440" bIns="45720" rtlCol="0"/>
+          <a:lstStyle/>
+          <a:p>
+            <a:pPr lvl="0"/>
+            <a:r>
+              <a:rPr lang="en-US"/>
+              <a:t>Click to edit Master text styles</a:t>
+            </a:r>
+          </a:p>
+          <a:p>
+            <a:pPr lvl="1"/>
+            <a:r>
+              <a:rPr lang="en-US"/>
+              <a:t>Second level</a:t>
+            </a:r>
+          </a:p>
+          <a:p>
+            <a:pPr lvl="2"/>
+            <a:r>
+              <a:rPr lang="en-US"/>
+              <a:t>Third level</a:t>
+            </a:r>
+          </a:p>
+          <a:p>
+            <a:pPr lvl="3"/>
+            <a:r>
+              <a:rPr lang="en-US"/>
+              <a:t>Fourth level</a:t>
+            </a:r>
+          </a:p>
+          <a:p>
+            <a:pPr lvl="4"/>
+            <a:r>
+              <a:rPr lang="en-US"/>
+              <a:t>Fifth level</a:t>
+            </a:r>
+            <a:endParaRPr lang="LID4096"/>
+          </a:p>
+        </p:txBody>
+      </p:sp>
+      <p:sp>
+        <p:nvSpPr>
+          <p:cNvPr id="6" name="Footer Placeholder 5"/>
+          <p:cNvSpPr>
+            <a:spLocks noGrp="1"/>
+          </p:cNvSpPr>
+          <p:nvPr>
+            <p:ph type="ftr" sz="quarter" idx="4"/>
+          </p:nvPr>
+        </p:nvSpPr>
+        <p:spPr>
+          <a:xfrm>
+            <a:off x="0" y="8685213"/>
+            <a:ext cx="2971800" cy="458787"/>
+          </a:xfrm>
+          <a:prstGeom prst="rect">
+            <a:avLst/>
+          </a:prstGeom>
+        </p:spPr>
+        <p:txBody>
+          <a:bodyPr vert="horz" lIns="91440" tIns="45720" rIns="91440" bIns="45720" rtlCol="0" anchor="b"/>
+          <a:lstStyle>
+            <a:lvl1pPr algn="l">
+              <a:defRPr sz="1200"/>
+            </a:lvl1pPr>
+          </a:lstStyle>
+          <a:p>
+            <a:endParaRPr lang="LID4096"/>
+          </a:p>
+        </p:txBody>
+      </p:sp>
+      <p:sp>
+        <p:nvSpPr>
+          <p:cNvPr id="7" name="Slide Number Placeholder 6"/>
+          <p:cNvSpPr>
+            <a:spLocks noGrp="1"/>
+          </p:cNvSpPr>
+          <p:nvPr>
+            <p:ph type="sldNum" sz="quarter" idx="5"/>
+          </p:nvPr>
+        </p:nvSpPr>
+        <p:spPr>
+          <a:xfrm>
+            <a:off x="3884613" y="8685213"/>
+            <a:ext cx="2971800" cy="458787"/>
+          </a:xfrm>
+          <a:prstGeom prst="rect">
+            <a:avLst/>
+          </a:prstGeom>
+        </p:spPr>
+        <p:txBody>
+          <a:bodyPr vert="horz" lIns="91440" tIns="45720" rIns="91440" bIns="45720" rtlCol="0" anchor="b"/>
+          <a:lstStyle>
+            <a:lvl1pPr algn="r">
+              <a:defRPr sz="1200"/>
+            </a:lvl1pPr>
+          </a:lstStyle>
+          <a:p>
+            <a:fld id="{6CE19DED-A906-40EC-B287-09C75A3F65FE}" type="slidenum">
+              <a:rPr lang="LID4096" smtClean="0"/>
+              <a:t>‹#›</a:t>
+            </a:fld>
+            <a:endParaRPr lang="LID4096"/>
+          </a:p>
+        </p:txBody>
+      </p:sp>
+    </p:spTree>
+    <p:extLst>
+      <p:ext uri="{BB962C8B-B14F-4D97-AF65-F5344CB8AC3E}">
+        <p14:creationId xmlns:p14="http://schemas.microsoft.com/office/powerpoint/2010/main" val="1499733431"/>
+      </p:ext>
+    </p:extLst>
+  </p:cSld>
+  <p:clrMap bg1="lt1" tx1="dk1" bg2="lt2" tx2="dk2" accent1="accent1" accent2="accent2" accent3="accent3" accent4="accent4" accent5="accent5" accent6="accent6" hlink="hlink" folHlink="folHlink"/>
+  <p:notesStyle>
+    <a:lvl1pPr marL="0" algn="l" defTabSz="914400" rtl="0" eaLnBrk="1" latinLnBrk="0" hangingPunct="1">
+      <a:defRPr sz="1200" kern="1200">
+        <a:solidFill>
+          <a:schemeClr val="tx1"/>
+        </a:solidFill>
+        <a:latin typeface="+mn-lt"/>
+        <a:ea typeface="+mn-ea"/>
+        <a:cs typeface="+mn-cs"/>
+      </a:defRPr>
+    </a:lvl1pPr>
+    <a:lvl2pPr marL="457200" algn="l" defTabSz="914400" rtl="0" eaLnBrk="1" latinLnBrk="0" hangingPunct="1">
+      <a:defRPr sz="1200" kern="1200">
+        <a:solidFill>
+          <a:schemeClr val="tx1"/>
+        </a:solidFill>
+        <a:latin typeface="+mn-lt"/>
+        <a:ea typeface="+mn-ea"/>
+        <a:cs typeface="+mn-cs"/>
+      </a:defRPr>
+    </a:lvl2pPr>
+    <a:lvl3pPr marL="914400" algn="l" defTabSz="914400" rtl="0" eaLnBrk="1" latinLnBrk="0" hangingPunct="1">
+      <a:defRPr sz="1200" kern="1200">
+        <a:solidFill>
+          <a:schemeClr val="tx1"/>
+        </a:solidFill>
+        <a:latin typeface="+mn-lt"/>
+        <a:ea typeface="+mn-ea"/>
+        <a:cs typeface="+mn-cs"/>
+      </a:defRPr>
+    </a:lvl3pPr>
+    <a:lvl4pPr marL="1371600" algn="l" defTabSz="914400" rtl="0" eaLnBrk="1" latinLnBrk="0" hangingPunct="1">
+      <a:defRPr sz="1200" kern="1200">
+        <a:solidFill>
+          <a:schemeClr val="tx1"/>
+        </a:solidFill>
+        <a:latin typeface="+mn-lt"/>
+        <a:ea typeface="+mn-ea"/>
+        <a:cs typeface="+mn-cs"/>
+      </a:defRPr>
+    </a:lvl4pPr>
+    <a:lvl5pPr marL="1828800" algn="l" defTabSz="914400" rtl="0" eaLnBrk="1" latinLnBrk="0" hangingPunct="1">
+      <a:defRPr sz="1200" kern="1200">
+        <a:solidFill>
+          <a:schemeClr val="tx1"/>
+        </a:solidFill>
+        <a:latin typeface="+mn-lt"/>
+        <a:ea typeface="+mn-ea"/>
+        <a:cs typeface="+mn-cs"/>
+      </a:defRPr>
+    </a:lvl5pPr>
+    <a:lvl6pPr marL="2286000" algn="l" defTabSz="914400" rtl="0" eaLnBrk="1" latinLnBrk="0" hangingPunct="1">
+      <a:defRPr sz="1200" kern="1200">
+        <a:solidFill>
+          <a:schemeClr val="tx1"/>
+        </a:solidFill>
+        <a:latin typeface="+mn-lt"/>
+        <a:ea typeface="+mn-ea"/>
+        <a:cs typeface="+mn-cs"/>
+      </a:defRPr>
+    </a:lvl6pPr>
+    <a:lvl7pPr marL="2743200" algn="l" defTabSz="914400" rtl="0" eaLnBrk="1" latinLnBrk="0" hangingPunct="1">
+      <a:defRPr sz="1200" kern="1200">
+        <a:solidFill>
+          <a:schemeClr val="tx1"/>
+        </a:solidFill>
+        <a:latin typeface="+mn-lt"/>
+        <a:ea typeface="+mn-ea"/>
+        <a:cs typeface="+mn-cs"/>
+      </a:defRPr>
+    </a:lvl7pPr>
+    <a:lvl8pPr marL="3200400" algn="l" defTabSz="914400" rtl="0" eaLnBrk="1" latinLnBrk="0" hangingPunct="1">
+      <a:defRPr sz="1200" kern="1200">
+        <a:solidFill>
+          <a:schemeClr val="tx1"/>
+        </a:solidFill>
+        <a:latin typeface="+mn-lt"/>
+        <a:ea typeface="+mn-ea"/>
+        <a:cs typeface="+mn-cs"/>
+      </a:defRPr>
+    </a:lvl8pPr>
+    <a:lvl9pPr marL="3657600" algn="l" defTabSz="914400" rtl="0" eaLnBrk="1" latinLnBrk="0" hangingPunct="1">
+      <a:defRPr sz="1200" kern="1200">
+        <a:solidFill>
+          <a:schemeClr val="tx1"/>
+        </a:solidFill>
+        <a:latin typeface="+mn-lt"/>
+        <a:ea typeface="+mn-ea"/>
+        <a:cs typeface="+mn-cs"/>
+      </a:defRPr>
+    </a:lvl9pPr>
+  </p:notesStyle>
+</p:notesMaster>
+</file>
+
+<file path=ppt/notesSlides/notesSlide1.xml><?xml version="1.0" encoding="utf-8"?>
+<p:notes xmlns:a="http://schemas.openxmlformats.org/drawingml/2006/main" xmlns:r="http://schemas.openxmlformats.org/officeDocument/2006/relationships" xmlns:p="http://schemas.openxmlformats.org/presentationml/2006/main">
+  <p:cSld>
+    <p:spTree>
+      <p:nvGrpSpPr>
+        <p:cNvPr id="1" name=""/>
+        <p:cNvGrpSpPr/>
+        <p:nvPr/>
+      </p:nvGrpSpPr>
+      <p:grpSpPr>
+        <a:xfrm>
+          <a:off x="0" y="0"/>
+          <a:ext cx="0" cy="0"/>
+          <a:chOff x="0" y="0"/>
+          <a:chExt cx="0" cy="0"/>
+        </a:xfrm>
+      </p:grpSpPr>
+      <p:sp>
+        <p:nvSpPr>
+          <p:cNvPr id="2" name="Slide Image Placeholder 1"/>
+          <p:cNvSpPr>
+            <a:spLocks noGrp="1" noRot="1" noChangeAspect="1"/>
+          </p:cNvSpPr>
+          <p:nvPr>
+            <p:ph type="sldImg"/>
+          </p:nvPr>
+        </p:nvSpPr>
+        <p:spPr/>
+      </p:sp>
+      <p:sp>
+        <p:nvSpPr>
+          <p:cNvPr id="3" name="Notes Placeholder 2"/>
+          <p:cNvSpPr>
+            <a:spLocks noGrp="1"/>
+          </p:cNvSpPr>
+          <p:nvPr>
+            <p:ph type="body" idx="1"/>
+          </p:nvPr>
+        </p:nvSpPr>
+        <p:spPr/>
+        <p:txBody>
+          <a:bodyPr/>
+          <a:lstStyle/>
+          <a:p>
+            <a:endParaRPr lang="LID4096" dirty="0"/>
+          </a:p>
+        </p:txBody>
+      </p:sp>
+      <p:sp>
+        <p:nvSpPr>
+          <p:cNvPr id="4" name="Slide Number Placeholder 3"/>
+          <p:cNvSpPr>
+            <a:spLocks noGrp="1"/>
+          </p:cNvSpPr>
+          <p:nvPr>
+            <p:ph type="sldNum" sz="quarter" idx="5"/>
+          </p:nvPr>
+        </p:nvSpPr>
+        <p:spPr/>
+        <p:txBody>
+          <a:bodyPr/>
+          <a:lstStyle/>
+          <a:p>
+            <a:fld id="{6CE19DED-A906-40EC-B287-09C75A3F65FE}" type="slidenum">
+              <a:rPr lang="LID4096" smtClean="0"/>
+              <a:t>1</a:t>
+            </a:fld>
+            <a:endParaRPr lang="LID4096"/>
+          </a:p>
+        </p:txBody>
+      </p:sp>
+    </p:spTree>
+    <p:extLst>
+      <p:ext uri="{BB962C8B-B14F-4D97-AF65-F5344CB8AC3E}">
+        <p14:creationId xmlns:p14="http://schemas.microsoft.com/office/powerpoint/2010/main" val="490252387"/>
+      </p:ext>
+    </p:extLst>
+  </p:cSld>
+  <p:clrMapOvr>
+    <a:masterClrMapping/>
+  </p:clrMapOvr>
+</p:notes>
+</file>
+
 <file path=ppt/slideLayouts/slideLayout1.xml><?xml version="1.0" encoding="utf-8"?>
 <p:sldLayout xmlns:a="http://schemas.openxmlformats.org/drawingml/2006/main" xmlns:r="http://schemas.openxmlformats.org/officeDocument/2006/relationships" xmlns:p="http://schemas.openxmlformats.org/presentationml/2006/main" type="title" preserve="1">
   <p:cSld name="Title Slide">
@@ -259,7 +697,7 @@
           <a:p>
             <a:fld id="{B2494730-E79D-4541-88B3-2A60631E96D7}" type="datetimeFigureOut">
               <a:rPr lang="en-US" smtClean="0"/>
-              <a:t>1/26/2024</a:t>
+              <a:t>1/28/2024</a:t>
             </a:fld>
             <a:endParaRPr lang="en-US"/>
           </a:p>
@@ -457,7 +895,7 @@
           <a:p>
             <a:fld id="{B2494730-E79D-4541-88B3-2A60631E96D7}" type="datetimeFigureOut">
               <a:rPr lang="en-US" smtClean="0"/>
-              <a:t>1/26/2024</a:t>
+              <a:t>1/28/2024</a:t>
             </a:fld>
             <a:endParaRPr lang="en-US"/>
           </a:p>
@@ -665,7 +1103,7 @@
           <a:p>
             <a:fld id="{B2494730-E79D-4541-88B3-2A60631E96D7}" type="datetimeFigureOut">
               <a:rPr lang="en-US" smtClean="0"/>
-              <a:t>1/26/2024</a:t>
+              <a:t>1/28/2024</a:t>
             </a:fld>
             <a:endParaRPr lang="en-US"/>
           </a:p>
@@ -863,7 +1301,7 @@
           <a:p>
             <a:fld id="{B2494730-E79D-4541-88B3-2A60631E96D7}" type="datetimeFigureOut">
               <a:rPr lang="en-US" smtClean="0"/>
-              <a:t>1/26/2024</a:t>
+              <a:t>1/28/2024</a:t>
             </a:fld>
             <a:endParaRPr lang="en-US"/>
           </a:p>
@@ -1138,7 +1576,7 @@
           <a:p>
             <a:fld id="{B2494730-E79D-4541-88B3-2A60631E96D7}" type="datetimeFigureOut">
               <a:rPr lang="en-US" smtClean="0"/>
-              <a:t>1/26/2024</a:t>
+              <a:t>1/28/2024</a:t>
             </a:fld>
             <a:endParaRPr lang="en-US"/>
           </a:p>
@@ -1403,7 +1841,7 @@
           <a:p>
             <a:fld id="{B2494730-E79D-4541-88B3-2A60631E96D7}" type="datetimeFigureOut">
               <a:rPr lang="en-US" smtClean="0"/>
-              <a:t>1/26/2024</a:t>
+              <a:t>1/28/2024</a:t>
             </a:fld>
             <a:endParaRPr lang="en-US"/>
           </a:p>
@@ -1815,7 +2253,7 @@
           <a:p>
             <a:fld id="{B2494730-E79D-4541-88B3-2A60631E96D7}" type="datetimeFigureOut">
               <a:rPr lang="en-US" smtClean="0"/>
-              <a:t>1/26/2024</a:t>
+              <a:t>1/28/2024</a:t>
             </a:fld>
             <a:endParaRPr lang="en-US"/>
           </a:p>
@@ -1956,7 +2394,7 @@
           <a:p>
             <a:fld id="{B2494730-E79D-4541-88B3-2A60631E96D7}" type="datetimeFigureOut">
               <a:rPr lang="en-US" smtClean="0"/>
-              <a:t>1/26/2024</a:t>
+              <a:t>1/28/2024</a:t>
             </a:fld>
             <a:endParaRPr lang="en-US"/>
           </a:p>
@@ -2069,7 +2507,7 @@
           <a:p>
             <a:fld id="{B2494730-E79D-4541-88B3-2A60631E96D7}" type="datetimeFigureOut">
               <a:rPr lang="en-US" smtClean="0"/>
-              <a:t>1/26/2024</a:t>
+              <a:t>1/28/2024</a:t>
             </a:fld>
             <a:endParaRPr lang="en-US"/>
           </a:p>
@@ -2380,7 +2818,7 @@
           <a:p>
             <a:fld id="{B2494730-E79D-4541-88B3-2A60631E96D7}" type="datetimeFigureOut">
               <a:rPr lang="en-US" smtClean="0"/>
-              <a:t>1/26/2024</a:t>
+              <a:t>1/28/2024</a:t>
             </a:fld>
             <a:endParaRPr lang="en-US"/>
           </a:p>
@@ -2668,7 +3106,7 @@
           <a:p>
             <a:fld id="{B2494730-E79D-4541-88B3-2A60631E96D7}" type="datetimeFigureOut">
               <a:rPr lang="en-US" smtClean="0"/>
-              <a:t>1/26/2024</a:t>
+              <a:t>1/28/2024</a:t>
             </a:fld>
             <a:endParaRPr lang="en-US"/>
           </a:p>
@@ -2909,7 +3347,7 @@
           <a:p>
             <a:fld id="{B2494730-E79D-4541-88B3-2A60631E96D7}" type="datetimeFigureOut">
               <a:rPr lang="en-US" smtClean="0"/>
-              <a:t>1/26/2024</a:t>
+              <a:t>1/28/2024</a:t>
             </a:fld>
             <a:endParaRPr lang="en-US"/>
           </a:p>
@@ -3326,48 +3764,12 @@
           <a:chExt cx="0" cy="0"/>
         </a:xfrm>
       </p:grpSpPr>
-      <p:pic>
-        <p:nvPicPr>
-          <p:cNvPr id="3" name="Picture 2" descr="A diagram of a triangle with lines and numbers&#10;&#10;Description automatically generated">
-            <a:extLst>
-              <a:ext uri="{FF2B5EF4-FFF2-40B4-BE49-F238E27FC236}">
-                <a16:creationId xmlns:a16="http://schemas.microsoft.com/office/drawing/2014/main" id="{E9C8AB69-ED0D-27D7-CE48-48DDF78D96A5}"/>
-              </a:ext>
-            </a:extLst>
-          </p:cNvPr>
-          <p:cNvPicPr>
-            <a:picLocks noChangeAspect="1"/>
-          </p:cNvPicPr>
-          <p:nvPr/>
-        </p:nvPicPr>
-        <p:blipFill>
-          <a:blip r:embed="rId2">
-            <a:extLst>
-              <a:ext uri="{28A0092B-C50C-407E-A947-70E740481C1C}">
-                <a14:useLocalDpi xmlns:a14="http://schemas.microsoft.com/office/drawing/2010/main" val="0"/>
-              </a:ext>
-            </a:extLst>
-          </a:blip>
-          <a:stretch>
-            <a:fillRect/>
-          </a:stretch>
-        </p:blipFill>
-        <p:spPr>
-          <a:xfrm>
-            <a:off x="790575" y="0"/>
-            <a:ext cx="10610850" cy="6858000"/>
-          </a:xfrm>
-          <a:prstGeom prst="rect">
-            <a:avLst/>
-          </a:prstGeom>
-        </p:spPr>
-      </p:pic>
       <p:grpSp>
         <p:nvGrpSpPr>
-          <p:cNvPr id="43" name="Group 42">
-            <a:extLst>
-              <a:ext uri="{FF2B5EF4-FFF2-40B4-BE49-F238E27FC236}">
-                <a16:creationId xmlns:a16="http://schemas.microsoft.com/office/drawing/2014/main" id="{D312B070-A289-9502-A89E-C748089510DD}"/>
+          <p:cNvPr id="23" name="Group 22">
+            <a:extLst>
+              <a:ext uri="{FF2B5EF4-FFF2-40B4-BE49-F238E27FC236}">
+                <a16:creationId xmlns:a16="http://schemas.microsoft.com/office/drawing/2014/main" id="{B621F8B6-56D5-73CB-1153-4834270526C8}"/>
               </a:ext>
             </a:extLst>
           </p:cNvPr>
@@ -3376,18 +3778,54 @@
         </p:nvGrpSpPr>
         <p:grpSpPr>
           <a:xfrm>
-            <a:off x="5011186" y="2229012"/>
-            <a:ext cx="761541" cy="659956"/>
-            <a:chOff x="5011186" y="2229012"/>
-            <a:chExt cx="761541" cy="659956"/>
+            <a:off x="763287" y="0"/>
+            <a:ext cx="10610850" cy="6858000"/>
+            <a:chOff x="763287" y="0"/>
+            <a:chExt cx="10610850" cy="6858000"/>
           </a:xfrm>
         </p:grpSpPr>
+        <p:pic>
+          <p:nvPicPr>
+            <p:cNvPr id="3" name="Picture 2" descr="A diagram of a triangle with lines and numbers&#10;&#10;Description automatically generated">
+              <a:extLst>
+                <a:ext uri="{FF2B5EF4-FFF2-40B4-BE49-F238E27FC236}">
+                  <a16:creationId xmlns:a16="http://schemas.microsoft.com/office/drawing/2014/main" id="{E9C8AB69-ED0D-27D7-CE48-48DDF78D96A5}"/>
+                </a:ext>
+              </a:extLst>
+            </p:cNvPr>
+            <p:cNvPicPr>
+              <a:picLocks noChangeAspect="1"/>
+            </p:cNvPicPr>
+            <p:nvPr/>
+          </p:nvPicPr>
+          <p:blipFill>
+            <a:blip r:embed="rId3">
+              <a:extLst>
+                <a:ext uri="{28A0092B-C50C-407E-A947-70E740481C1C}">
+                  <a14:useLocalDpi xmlns:a14="http://schemas.microsoft.com/office/drawing/2010/main" val="0"/>
+                </a:ext>
+              </a:extLst>
+            </a:blip>
+            <a:stretch>
+              <a:fillRect/>
+            </a:stretch>
+          </p:blipFill>
+          <p:spPr>
+            <a:xfrm>
+              <a:off x="763287" y="0"/>
+              <a:ext cx="10610850" cy="6858000"/>
+            </a:xfrm>
+            <a:prstGeom prst="rect">
+              <a:avLst/>
+            </a:prstGeom>
+          </p:spPr>
+        </p:pic>
         <p:grpSp>
           <p:nvGrpSpPr>
-            <p:cNvPr id="39" name="Group 38">
+            <p:cNvPr id="43" name="Group 42">
               <a:extLst>
                 <a:ext uri="{FF2B5EF4-FFF2-40B4-BE49-F238E27FC236}">
-                  <a16:creationId xmlns:a16="http://schemas.microsoft.com/office/drawing/2014/main" id="{838A9DC5-4A39-8B94-BF54-C6D9428B9704}"/>
+                  <a16:creationId xmlns:a16="http://schemas.microsoft.com/office/drawing/2014/main" id="{D312B070-A289-9502-A89E-C748089510DD}"/>
                 </a:ext>
               </a:extLst>
             </p:cNvPr>
@@ -3396,37 +3834,648 @@
           </p:nvGrpSpPr>
           <p:grpSpPr>
             <a:xfrm>
-              <a:off x="5287224" y="2353901"/>
-              <a:ext cx="485503" cy="488887"/>
-              <a:chOff x="5287224" y="2353901"/>
-              <a:chExt cx="485503" cy="488887"/>
+              <a:off x="4982611" y="2303690"/>
+              <a:ext cx="761541" cy="659956"/>
+              <a:chOff x="5011186" y="2229012"/>
+              <a:chExt cx="761541" cy="659956"/>
             </a:xfrm>
           </p:grpSpPr>
-          <p:cxnSp>
-            <p:nvCxnSpPr>
-              <p:cNvPr id="7" name="Straight Arrow Connector 6">
+          <p:grpSp>
+            <p:nvGrpSpPr>
+              <p:cNvPr id="39" name="Group 38">
                 <a:extLst>
                   <a:ext uri="{FF2B5EF4-FFF2-40B4-BE49-F238E27FC236}">
-                    <a16:creationId xmlns:a16="http://schemas.microsoft.com/office/drawing/2014/main" id="{F5F057FB-DD2F-832C-FD83-24D6316AB72E}"/>
+                    <a16:creationId xmlns:a16="http://schemas.microsoft.com/office/drawing/2014/main" id="{838A9DC5-4A39-8B94-BF54-C6D9428B9704}"/>
                   </a:ext>
                 </a:extLst>
               </p:cNvPr>
-              <p:cNvCxnSpPr/>
+              <p:cNvGrpSpPr/>
               <p:nvPr/>
-            </p:nvCxnSpPr>
+            </p:nvGrpSpPr>
+            <p:grpSpPr>
+              <a:xfrm>
+                <a:off x="5287224" y="2353901"/>
+                <a:ext cx="485503" cy="488887"/>
+                <a:chOff x="5287224" y="2353901"/>
+                <a:chExt cx="485503" cy="488887"/>
+              </a:xfrm>
+            </p:grpSpPr>
+            <p:cxnSp>
+              <p:nvCxnSpPr>
+                <p:cNvPr id="7" name="Straight Arrow Connector 6">
+                  <a:extLst>
+                    <a:ext uri="{FF2B5EF4-FFF2-40B4-BE49-F238E27FC236}">
+                      <a16:creationId xmlns:a16="http://schemas.microsoft.com/office/drawing/2014/main" id="{F5F057FB-DD2F-832C-FD83-24D6316AB72E}"/>
+                    </a:ext>
+                  </a:extLst>
+                </p:cNvPr>
+                <p:cNvCxnSpPr/>
+                <p:nvPr/>
+              </p:nvCxnSpPr>
+              <p:spPr>
+                <a:xfrm flipV="1">
+                  <a:off x="5287224" y="2353901"/>
+                  <a:ext cx="0" cy="488887"/>
+                </a:xfrm>
+                <a:prstGeom prst="straightConnector1">
+                  <a:avLst/>
+                </a:prstGeom>
+                <a:ln w="15875">
+                  <a:solidFill>
+                    <a:schemeClr val="tx1"/>
+                  </a:solidFill>
+                  <a:tailEnd type="triangle" w="lg" len="med"/>
+                </a:ln>
+              </p:spPr>
+              <p:style>
+                <a:lnRef idx="1">
+                  <a:schemeClr val="accent1"/>
+                </a:lnRef>
+                <a:fillRef idx="0">
+                  <a:schemeClr val="accent1"/>
+                </a:fillRef>
+                <a:effectRef idx="0">
+                  <a:schemeClr val="accent1"/>
+                </a:effectRef>
+                <a:fontRef idx="minor">
+                  <a:schemeClr val="tx1"/>
+                </a:fontRef>
+              </p:style>
+            </p:cxnSp>
+            <p:cxnSp>
+              <p:nvCxnSpPr>
+                <p:cNvPr id="8" name="Straight Arrow Connector 7">
+                  <a:extLst>
+                    <a:ext uri="{FF2B5EF4-FFF2-40B4-BE49-F238E27FC236}">
+                      <a16:creationId xmlns:a16="http://schemas.microsoft.com/office/drawing/2014/main" id="{EA502240-5282-2CFC-3045-729BCF0DC0E7}"/>
+                    </a:ext>
+                  </a:extLst>
+                </p:cNvPr>
+                <p:cNvCxnSpPr>
+                  <a:cxnSpLocks/>
+                </p:cNvCxnSpPr>
+                <p:nvPr/>
+              </p:nvCxnSpPr>
+              <p:spPr>
+                <a:xfrm>
+                  <a:off x="5287224" y="2842788"/>
+                  <a:ext cx="485503" cy="0"/>
+                </a:xfrm>
+                <a:prstGeom prst="straightConnector1">
+                  <a:avLst/>
+                </a:prstGeom>
+                <a:ln w="15875">
+                  <a:solidFill>
+                    <a:schemeClr val="tx1"/>
+                  </a:solidFill>
+                  <a:tailEnd type="triangle" w="lg" len="med"/>
+                </a:ln>
+              </p:spPr>
+              <p:style>
+                <a:lnRef idx="1">
+                  <a:schemeClr val="accent1"/>
+                </a:lnRef>
+                <a:fillRef idx="0">
+                  <a:schemeClr val="accent1"/>
+                </a:fillRef>
+                <a:effectRef idx="0">
+                  <a:schemeClr val="accent1"/>
+                </a:effectRef>
+                <a:fontRef idx="minor">
+                  <a:schemeClr val="tx1"/>
+                </a:fontRef>
+              </p:style>
+            </p:cxnSp>
+          </p:grpSp>
+          <p:sp>
+            <p:nvSpPr>
+              <p:cNvPr id="41" name="TextBox 40">
+                <a:extLst>
+                  <a:ext uri="{FF2B5EF4-FFF2-40B4-BE49-F238E27FC236}">
+                    <a16:creationId xmlns:a16="http://schemas.microsoft.com/office/drawing/2014/main" id="{95740A90-C008-44DA-06C2-244FC31262D7}"/>
+                  </a:ext>
+                </a:extLst>
+              </p:cNvPr>
+              <p:cNvSpPr txBox="1"/>
+              <p:nvPr/>
+            </p:nvSpPr>
             <p:spPr>
-              <a:xfrm flipV="1">
-                <a:off x="5287224" y="2353901"/>
-                <a:ext cx="0" cy="488887"/>
+              <a:xfrm>
+                <a:off x="5011186" y="2229012"/>
+                <a:ext cx="276038" cy="369332"/>
               </a:xfrm>
-              <a:prstGeom prst="straightConnector1">
+              <a:prstGeom prst="rect">
                 <a:avLst/>
+              </a:prstGeom>
+              <a:noFill/>
+            </p:spPr>
+            <p:txBody>
+              <a:bodyPr wrap="none" rtlCol="0">
+                <a:spAutoFit/>
+              </a:bodyPr>
+              <a:lstStyle/>
+              <a:p>
+                <a:r>
+                  <a:rPr lang="en-US" dirty="0"/>
+                  <a:t>z</a:t>
+                </a:r>
+              </a:p>
+            </p:txBody>
+          </p:sp>
+          <p:sp>
+            <p:nvSpPr>
+              <p:cNvPr id="42" name="TextBox 41">
+                <a:extLst>
+                  <a:ext uri="{FF2B5EF4-FFF2-40B4-BE49-F238E27FC236}">
+                    <a16:creationId xmlns:a16="http://schemas.microsoft.com/office/drawing/2014/main" id="{65BEAAEE-0F7D-0E3D-8886-7222EC13B55E}"/>
+                  </a:ext>
+                </a:extLst>
+              </p:cNvPr>
+              <p:cNvSpPr txBox="1"/>
+              <p:nvPr/>
+            </p:nvSpPr>
+            <p:spPr>
+              <a:xfrm>
+                <a:off x="5471424" y="2550414"/>
+                <a:ext cx="292068" cy="338554"/>
+              </a:xfrm>
+              <a:prstGeom prst="rect">
+                <a:avLst/>
+              </a:prstGeom>
+              <a:noFill/>
+            </p:spPr>
+            <p:txBody>
+              <a:bodyPr wrap="none" rtlCol="0">
+                <a:spAutoFit/>
+              </a:bodyPr>
+              <a:lstStyle/>
+              <a:p>
+                <a:r>
+                  <a:rPr lang="en-US" sz="1600" dirty="0"/>
+                  <a:t>Y</a:t>
+                </a:r>
+              </a:p>
+            </p:txBody>
+          </p:sp>
+        </p:grpSp>
+        <p:cxnSp>
+          <p:nvCxnSpPr>
+            <p:cNvPr id="46" name="Straight Arrow Connector 45">
+              <a:extLst>
+                <a:ext uri="{FF2B5EF4-FFF2-40B4-BE49-F238E27FC236}">
+                  <a16:creationId xmlns:a16="http://schemas.microsoft.com/office/drawing/2014/main" id="{7F0DAB42-932C-48BC-9B62-1240B73D6D44}"/>
+                </a:ext>
+              </a:extLst>
+            </p:cNvPr>
+            <p:cNvCxnSpPr>
+              <a:cxnSpLocks/>
+            </p:cNvCxnSpPr>
+            <p:nvPr/>
+          </p:nvCxnSpPr>
+          <p:spPr>
+            <a:xfrm>
+              <a:off x="2863003" y="415925"/>
+              <a:ext cx="6019800" cy="0"/>
+            </a:xfrm>
+            <a:prstGeom prst="straightConnector1">
+              <a:avLst/>
+            </a:prstGeom>
+            <a:ln w="15875">
+              <a:solidFill>
+                <a:srgbClr val="0000FF"/>
+              </a:solidFill>
+              <a:headEnd type="triangle" w="lg" len="med"/>
+              <a:tailEnd type="triangle" w="lg" len="med"/>
+            </a:ln>
+          </p:spPr>
+          <p:style>
+            <a:lnRef idx="1">
+              <a:schemeClr val="accent1"/>
+            </a:lnRef>
+            <a:fillRef idx="0">
+              <a:schemeClr val="accent1"/>
+            </a:fillRef>
+            <a:effectRef idx="0">
+              <a:schemeClr val="accent1"/>
+            </a:effectRef>
+            <a:fontRef idx="minor">
+              <a:schemeClr val="tx1"/>
+            </a:fontRef>
+          </p:style>
+        </p:cxnSp>
+        <p:sp>
+          <p:nvSpPr>
+            <p:cNvPr id="48" name="TextBox 47">
+              <a:extLst>
+                <a:ext uri="{FF2B5EF4-FFF2-40B4-BE49-F238E27FC236}">
+                  <a16:creationId xmlns:a16="http://schemas.microsoft.com/office/drawing/2014/main" id="{BF85D73A-672A-BE3D-C65B-43AA7C63131E}"/>
+                </a:ext>
+              </a:extLst>
+            </p:cNvPr>
+            <p:cNvSpPr txBox="1"/>
+            <p:nvPr/>
+          </p:nvSpPr>
+          <p:spPr>
+            <a:xfrm>
+              <a:off x="5357388" y="122021"/>
+              <a:ext cx="976549" cy="338554"/>
+            </a:xfrm>
+            <a:prstGeom prst="rect">
+              <a:avLst/>
+            </a:prstGeom>
+            <a:noFill/>
+          </p:spPr>
+          <p:txBody>
+            <a:bodyPr wrap="none" rtlCol="0">
+              <a:spAutoFit/>
+            </a:bodyPr>
+            <a:lstStyle/>
+            <a:p>
+              <a:r>
+                <a:rPr lang="en-US" sz="1600" dirty="0">
+                  <a:solidFill>
+                    <a:srgbClr val="0000FF"/>
+                  </a:solidFill>
+                </a:rPr>
+                <a:t>Ls=12000</a:t>
+              </a:r>
+            </a:p>
+          </p:txBody>
+        </p:sp>
+        <p:sp>
+          <p:nvSpPr>
+            <p:cNvPr id="50" name="TextBox 49">
+              <a:extLst>
+                <a:ext uri="{FF2B5EF4-FFF2-40B4-BE49-F238E27FC236}">
+                  <a16:creationId xmlns:a16="http://schemas.microsoft.com/office/drawing/2014/main" id="{B6E12478-C667-F9C8-0BB7-28E8BFC50FB4}"/>
+                </a:ext>
+              </a:extLst>
+            </p:cNvPr>
+            <p:cNvSpPr txBox="1"/>
+            <p:nvPr/>
+          </p:nvSpPr>
+          <p:spPr>
+            <a:xfrm rot="2866623">
+              <a:off x="2151662" y="5739398"/>
+              <a:ext cx="437940" cy="338554"/>
+            </a:xfrm>
+            <a:prstGeom prst="rect">
+              <a:avLst/>
+            </a:prstGeom>
+            <a:noFill/>
+          </p:spPr>
+          <p:txBody>
+            <a:bodyPr wrap="none" rtlCol="0">
+              <a:spAutoFit/>
+            </a:bodyPr>
+            <a:lstStyle/>
+            <a:p>
+              <a:r>
+                <a:rPr lang="en-US" sz="1600" dirty="0" err="1">
+                  <a:solidFill>
+                    <a:srgbClr val="0000FF"/>
+                  </a:solidFill>
+                </a:rPr>
+                <a:t>Lm</a:t>
+              </a:r>
+              <a:endParaRPr lang="en-US" sz="1600" dirty="0">
+                <a:solidFill>
+                  <a:srgbClr val="0000FF"/>
+                </a:solidFill>
+              </a:endParaRPr>
+            </a:p>
+          </p:txBody>
+        </p:sp>
+        <mc:AlternateContent xmlns:mc="http://schemas.openxmlformats.org/markup-compatibility/2006">
+          <mc:Choice xmlns:a14="http://schemas.microsoft.com/office/drawing/2010/main" Requires="a14">
+            <p:sp>
+              <p:nvSpPr>
+                <p:cNvPr id="52" name="TextBox 51">
+                  <a:extLst>
+                    <a:ext uri="{FF2B5EF4-FFF2-40B4-BE49-F238E27FC236}">
+                      <a16:creationId xmlns:a16="http://schemas.microsoft.com/office/drawing/2014/main" id="{F57D5C52-6510-B352-F138-695ADA0C5683}"/>
+                    </a:ext>
+                  </a:extLst>
+                </p:cNvPr>
+                <p:cNvSpPr txBox="1"/>
+                <p:nvPr/>
+              </p:nvSpPr>
+              <p:spPr>
+                <a:xfrm>
+                  <a:off x="4670131" y="3429000"/>
+                  <a:ext cx="649280" cy="338554"/>
+                </a:xfrm>
+                <a:prstGeom prst="rect">
+                  <a:avLst/>
+                </a:prstGeom>
+                <a:noFill/>
+              </p:spPr>
+              <p:txBody>
+                <a:bodyPr wrap="none" rtlCol="0">
+                  <a:spAutoFit/>
+                </a:bodyPr>
+                <a:lstStyle/>
+                <a:p>
+                  <a:pPr/>
+                  <a14:m>
+                    <m:oMathPara xmlns:m="http://schemas.openxmlformats.org/officeDocument/2006/math">
+                      <m:oMathParaPr>
+                        <m:jc m:val="centerGroup"/>
+                      </m:oMathParaPr>
+                      <m:oMath xmlns:m="http://schemas.openxmlformats.org/officeDocument/2006/math">
+                        <m:sSub>
+                          <m:sSubPr>
+                            <m:ctrlPr>
+                              <a:rPr lang="en-US" sz="1600" smtClean="0">
+                                <a:solidFill>
+                                  <a:srgbClr val="0000FF"/>
+                                </a:solidFill>
+                                <a:latin typeface="Cambria Math" panose="02040503050406030204" pitchFamily="18" charset="0"/>
+                              </a:rPr>
+                            </m:ctrlPr>
+                          </m:sSubPr>
+                          <m:e>
+                            <m:r>
+                              <m:rPr>
+                                <m:sty m:val="p"/>
+                              </m:rPr>
+                              <a:rPr lang="en-US" sz="1600" b="0" i="0" smtClean="0">
+                                <a:solidFill>
+                                  <a:srgbClr val="0000FF"/>
+                                </a:solidFill>
+                                <a:latin typeface="Cambria Math" panose="02040503050406030204" pitchFamily="18" charset="0"/>
+                              </a:rPr>
+                              <m:t>θ</m:t>
+                            </m:r>
+                          </m:e>
+                          <m:sub>
+                            <m:r>
+                              <a:rPr lang="en-US" sz="1600" b="0" i="0" smtClean="0">
+                                <a:solidFill>
+                                  <a:srgbClr val="0000FF"/>
+                                </a:solidFill>
+                                <a:latin typeface="Cambria Math" panose="02040503050406030204" pitchFamily="18" charset="0"/>
+                              </a:rPr>
+                              <m:t>0</m:t>
+                            </m:r>
+                          </m:sub>
+                        </m:sSub>
+                        <m:r>
+                          <a:rPr lang="en-US" sz="1600" b="0" i="0" smtClean="0">
+                            <a:solidFill>
+                              <a:srgbClr val="0000FF"/>
+                            </a:solidFill>
+                            <a:latin typeface="Cambria Math" panose="02040503050406030204" pitchFamily="18" charset="0"/>
+                          </a:rPr>
+                          <m:t>/2</m:t>
+                        </m:r>
+                      </m:oMath>
+                    </m:oMathPara>
+                  </a14:m>
+                  <a:endParaRPr lang="en-US" sz="1600" dirty="0">
+                    <a:solidFill>
+                      <a:srgbClr val="0000FF"/>
+                    </a:solidFill>
+                  </a:endParaRPr>
+                </a:p>
+              </p:txBody>
+            </p:sp>
+          </mc:Choice>
+          <mc:Fallback>
+            <p:sp>
+              <p:nvSpPr>
+                <p:cNvPr id="52" name="TextBox 51">
+                  <a:extLst>
+                    <a:ext uri="{FF2B5EF4-FFF2-40B4-BE49-F238E27FC236}">
+                      <a16:creationId xmlns:a16="http://schemas.microsoft.com/office/drawing/2014/main" id="{F57D5C52-6510-B352-F138-695ADA0C5683}"/>
+                    </a:ext>
+                  </a:extLst>
+                </p:cNvPr>
+                <p:cNvSpPr txBox="1">
+                  <a:spLocks noRot="1" noChangeAspect="1" noMove="1" noResize="1" noEditPoints="1" noAdjustHandles="1" noChangeArrowheads="1" noChangeShapeType="1" noTextEdit="1"/>
+                </p:cNvSpPr>
+                <p:nvPr/>
+              </p:nvSpPr>
+              <p:spPr>
+                <a:xfrm>
+                  <a:off x="4670131" y="3429000"/>
+                  <a:ext cx="649280" cy="338554"/>
+                </a:xfrm>
+                <a:prstGeom prst="rect">
+                  <a:avLst/>
+                </a:prstGeom>
+                <a:blipFill>
+                  <a:blip r:embed="rId4"/>
+                  <a:stretch>
+                    <a:fillRect b="-9091"/>
+                  </a:stretch>
+                </a:blipFill>
+              </p:spPr>
+              <p:txBody>
+                <a:bodyPr/>
+                <a:lstStyle/>
+                <a:p>
+                  <a:r>
+                    <a:rPr lang="LID4096">
+                      <a:noFill/>
+                    </a:rPr>
+                    <a:t> </a:t>
+                  </a:r>
+                </a:p>
+              </p:txBody>
+            </p:sp>
+          </mc:Fallback>
+        </mc:AlternateContent>
+        <p:cxnSp>
+          <p:nvCxnSpPr>
+            <p:cNvPr id="58" name="Straight Connector 57">
+              <a:extLst>
+                <a:ext uri="{FF2B5EF4-FFF2-40B4-BE49-F238E27FC236}">
+                  <a16:creationId xmlns:a16="http://schemas.microsoft.com/office/drawing/2014/main" id="{84CBB8B1-DA40-C6F5-ACE7-9FBD4749732B}"/>
+                </a:ext>
+              </a:extLst>
+            </p:cNvPr>
+            <p:cNvCxnSpPr>
+              <a:cxnSpLocks/>
+            </p:cNvCxnSpPr>
+            <p:nvPr/>
+          </p:nvCxnSpPr>
+          <p:spPr>
+            <a:xfrm flipV="1">
+              <a:off x="4822825" y="3705657"/>
+              <a:ext cx="464399" cy="110692"/>
+            </a:xfrm>
+            <a:prstGeom prst="line">
+              <a:avLst/>
+            </a:prstGeom>
+            <a:ln w="38100">
+              <a:solidFill>
+                <a:srgbClr val="0000FF"/>
+              </a:solidFill>
+              <a:headEnd type="stealth"/>
+              <a:tailEnd type="stealth"/>
+            </a:ln>
+          </p:spPr>
+          <p:style>
+            <a:lnRef idx="1">
+              <a:schemeClr val="accent1"/>
+            </a:lnRef>
+            <a:fillRef idx="0">
+              <a:schemeClr val="accent1"/>
+            </a:fillRef>
+            <a:effectRef idx="0">
+              <a:schemeClr val="accent1"/>
+            </a:effectRef>
+            <a:fontRef idx="minor">
+              <a:schemeClr val="tx1"/>
+            </a:fontRef>
+          </p:style>
+        </p:cxnSp>
+        <p:sp>
+          <p:nvSpPr>
+            <p:cNvPr id="12" name="Arc 11">
+              <a:extLst>
+                <a:ext uri="{FF2B5EF4-FFF2-40B4-BE49-F238E27FC236}">
+                  <a16:creationId xmlns:a16="http://schemas.microsoft.com/office/drawing/2014/main" id="{C7C3072A-C119-FBA5-3B0C-BE51A60878BE}"/>
+                </a:ext>
+              </a:extLst>
+            </p:cNvPr>
+            <p:cNvSpPr/>
+            <p:nvPr/>
+          </p:nvSpPr>
+          <p:spPr>
+            <a:xfrm rot="3975703" flipH="1">
+              <a:off x="4418507" y="2309740"/>
+              <a:ext cx="993205" cy="863624"/>
+            </a:xfrm>
+            <a:prstGeom prst="arc">
+              <a:avLst>
+                <a:gd name="adj1" fmla="val 17446005"/>
+                <a:gd name="adj2" fmla="val 19962129"/>
+              </a:avLst>
+            </a:prstGeom>
+            <a:ln w="15875">
+              <a:solidFill>
+                <a:srgbClr val="0000FF"/>
+              </a:solidFill>
+              <a:headEnd type="triangle" w="sm" len="med"/>
+            </a:ln>
+          </p:spPr>
+          <p:style>
+            <a:lnRef idx="1">
+              <a:schemeClr val="accent1"/>
+            </a:lnRef>
+            <a:fillRef idx="0">
+              <a:schemeClr val="accent1"/>
+            </a:fillRef>
+            <a:effectRef idx="0">
+              <a:schemeClr val="accent1"/>
+            </a:effectRef>
+            <a:fontRef idx="minor">
+              <a:schemeClr val="tx1"/>
+            </a:fontRef>
+          </p:style>
+          <p:txBody>
+            <a:bodyPr rtlCol="0" anchor="ctr"/>
+            <a:lstStyle/>
+            <a:p>
+              <a:pPr algn="ctr"/>
+              <a:endParaRPr lang="LID4096"/>
+            </a:p>
+          </p:txBody>
+        </p:sp>
+        <p:grpSp>
+          <p:nvGrpSpPr>
+            <p:cNvPr id="14" name="Group 13">
+              <a:extLst>
+                <a:ext uri="{FF2B5EF4-FFF2-40B4-BE49-F238E27FC236}">
+                  <a16:creationId xmlns:a16="http://schemas.microsoft.com/office/drawing/2014/main" id="{21DD1331-2540-F637-021E-64CBB22FD761}"/>
+                </a:ext>
+              </a:extLst>
+            </p:cNvPr>
+            <p:cNvGrpSpPr/>
+            <p:nvPr/>
+          </p:nvGrpSpPr>
+          <p:grpSpPr>
+            <a:xfrm>
+              <a:off x="1391393" y="3049371"/>
+              <a:ext cx="1641707" cy="645174"/>
+              <a:chOff x="1391393" y="3049371"/>
+              <a:chExt cx="1641707" cy="645174"/>
+            </a:xfrm>
+          </p:grpSpPr>
+          <p:sp>
+            <p:nvSpPr>
+              <p:cNvPr id="2" name="TextBox 1">
+                <a:extLst>
+                  <a:ext uri="{FF2B5EF4-FFF2-40B4-BE49-F238E27FC236}">
+                    <a16:creationId xmlns:a16="http://schemas.microsoft.com/office/drawing/2014/main" id="{05217AA3-229F-BCF4-EA85-A2FC4D3583F8}"/>
+                  </a:ext>
+                </a:extLst>
+              </p:cNvPr>
+              <p:cNvSpPr txBox="1"/>
+              <p:nvPr/>
+            </p:nvSpPr>
+            <p:spPr>
+              <a:xfrm>
+                <a:off x="1391393" y="3049371"/>
+                <a:ext cx="1049454" cy="307777"/>
+              </a:xfrm>
+              <a:prstGeom prst="rect">
+                <a:avLst/>
+              </a:prstGeom>
+              <a:noFill/>
+            </p:spPr>
+            <p:txBody>
+              <a:bodyPr wrap="none" rtlCol="0">
+                <a:spAutoFit/>
+              </a:bodyPr>
+              <a:lstStyle/>
+              <a:p>
+                <a:r>
+                  <a:rPr lang="en-US" sz="1400" dirty="0">
+                    <a:solidFill>
+                      <a:srgbClr val="0000FF"/>
+                    </a:solidFill>
+                  </a:rPr>
+                  <a:t>‘Coord_M2’</a:t>
+                </a:r>
+                <a:endParaRPr lang="LID4096" sz="1400" dirty="0">
+                  <a:solidFill>
+                    <a:srgbClr val="0000FF"/>
+                  </a:solidFill>
+                </a:endParaRPr>
+              </a:p>
+            </p:txBody>
+          </p:sp>
+          <p:sp>
+            <p:nvSpPr>
+              <p:cNvPr id="13" name="Arc 12">
+                <a:extLst>
+                  <a:ext uri="{FF2B5EF4-FFF2-40B4-BE49-F238E27FC236}">
+                    <a16:creationId xmlns:a16="http://schemas.microsoft.com/office/drawing/2014/main" id="{B5355571-F58F-F7BB-FF56-70851D70A3DF}"/>
+                  </a:ext>
+                </a:extLst>
+              </p:cNvPr>
+              <p:cNvSpPr/>
+              <p:nvPr/>
+            </p:nvSpPr>
+            <p:spPr>
+              <a:xfrm rot="3294385" flipH="1">
+                <a:off x="2160940" y="2822385"/>
+                <a:ext cx="614933" cy="1129387"/>
+              </a:xfrm>
+              <a:prstGeom prst="arc">
+                <a:avLst>
+                  <a:gd name="adj1" fmla="val 17045100"/>
+                  <a:gd name="adj2" fmla="val 19962129"/>
+                </a:avLst>
               </a:prstGeom>
               <a:ln w="15875">
                 <a:solidFill>
                   <a:srgbClr val="0000FF"/>
                 </a:solidFill>
-                <a:tailEnd type="triangle" w="lg" len="med"/>
+                <a:headEnd type="triangle" w="sm" len="med"/>
               </a:ln>
             </p:spPr>
             <p:style>
@@ -3443,58 +4492,22 @@
                 <a:schemeClr val="tx1"/>
               </a:fontRef>
             </p:style>
-          </p:cxnSp>
-          <p:cxnSp>
-            <p:nvCxnSpPr>
-              <p:cNvPr id="8" name="Straight Arrow Connector 7">
-                <a:extLst>
-                  <a:ext uri="{FF2B5EF4-FFF2-40B4-BE49-F238E27FC236}">
-                    <a16:creationId xmlns:a16="http://schemas.microsoft.com/office/drawing/2014/main" id="{EA502240-5282-2CFC-3045-729BCF0DC0E7}"/>
-                  </a:ext>
-                </a:extLst>
-              </p:cNvPr>
-              <p:cNvCxnSpPr>
-                <a:cxnSpLocks/>
-              </p:cNvCxnSpPr>
-              <p:nvPr/>
-            </p:nvCxnSpPr>
-            <p:spPr>
-              <a:xfrm>
-                <a:off x="5287224" y="2842788"/>
-                <a:ext cx="485503" cy="0"/>
-              </a:xfrm>
-              <a:prstGeom prst="straightConnector1">
-                <a:avLst/>
-              </a:prstGeom>
-              <a:ln w="15875">
-                <a:solidFill>
-                  <a:srgbClr val="00FF00"/>
-                </a:solidFill>
-                <a:tailEnd type="triangle" w="lg" len="med"/>
-              </a:ln>
-            </p:spPr>
-            <p:style>
-              <a:lnRef idx="1">
-                <a:schemeClr val="accent1"/>
-              </a:lnRef>
-              <a:fillRef idx="0">
-                <a:schemeClr val="accent1"/>
-              </a:fillRef>
-              <a:effectRef idx="0">
-                <a:schemeClr val="accent1"/>
-              </a:effectRef>
-              <a:fontRef idx="minor">
-                <a:schemeClr val="tx1"/>
-              </a:fontRef>
-            </p:style>
-          </p:cxnSp>
+            <p:txBody>
+              <a:bodyPr rtlCol="0" anchor="ctr"/>
+              <a:lstStyle/>
+              <a:p>
+                <a:pPr algn="ctr"/>
+                <a:endParaRPr lang="LID4096"/>
+              </a:p>
+            </p:txBody>
+          </p:sp>
         </p:grpSp>
         <p:sp>
           <p:nvSpPr>
-            <p:cNvPr id="41" name="TextBox 40">
+            <p:cNvPr id="16" name="TextBox 15">
               <a:extLst>
                 <a:ext uri="{FF2B5EF4-FFF2-40B4-BE49-F238E27FC236}">
-                  <a16:creationId xmlns:a16="http://schemas.microsoft.com/office/drawing/2014/main" id="{95740A90-C008-44DA-06C2-244FC31262D7}"/>
+                  <a16:creationId xmlns:a16="http://schemas.microsoft.com/office/drawing/2014/main" id="{875BF7B9-669C-A0D8-D956-6A8743347EDC}"/>
                 </a:ext>
               </a:extLst>
             </p:cNvPr>
@@ -3503,8 +4516,8 @@
           </p:nvSpPr>
           <p:spPr>
             <a:xfrm>
-              <a:off x="5011186" y="2229012"/>
-              <a:ext cx="276038" cy="369332"/>
+              <a:off x="4340262" y="5091094"/>
+              <a:ext cx="1060931" cy="307777"/>
             </a:xfrm>
             <a:prstGeom prst="rect">
               <a:avLst/>
@@ -3518,22 +4531,80 @@
             <a:lstStyle/>
             <a:p>
               <a:r>
-                <a:rPr lang="en-US" b="1" dirty="0">
+                <a:rPr lang="en-US" sz="1400" dirty="0">
                   <a:solidFill>
                     <a:srgbClr val="0000FF"/>
                   </a:solidFill>
                 </a:rPr>
-                <a:t>z</a:t>
+                <a:t>‘Coord_M1’</a:t>
               </a:r>
+              <a:endParaRPr lang="LID4096" sz="1400" dirty="0">
+                <a:solidFill>
+                  <a:srgbClr val="0000FF"/>
+                </a:solidFill>
+              </a:endParaRPr>
             </a:p>
           </p:txBody>
         </p:sp>
         <p:sp>
           <p:nvSpPr>
-            <p:cNvPr id="42" name="TextBox 41">
+            <p:cNvPr id="17" name="Arc 16">
               <a:extLst>
                 <a:ext uri="{FF2B5EF4-FFF2-40B4-BE49-F238E27FC236}">
-                  <a16:creationId xmlns:a16="http://schemas.microsoft.com/office/drawing/2014/main" id="{65BEAAEE-0F7D-0E3D-8886-7222EC13B55E}"/>
+                  <a16:creationId xmlns:a16="http://schemas.microsoft.com/office/drawing/2014/main" id="{7B4E7AA5-C8F4-08C2-883F-A71B6AFE347F}"/>
+                </a:ext>
+              </a:extLst>
+            </p:cNvPr>
+            <p:cNvSpPr/>
+            <p:nvPr/>
+          </p:nvSpPr>
+          <p:spPr>
+            <a:xfrm rot="1071247" flipH="1">
+              <a:off x="4861589" y="4809664"/>
+              <a:ext cx="614933" cy="1129387"/>
+            </a:xfrm>
+            <a:prstGeom prst="arc">
+              <a:avLst>
+                <a:gd name="adj1" fmla="val 17045100"/>
+                <a:gd name="adj2" fmla="val 19962129"/>
+              </a:avLst>
+            </a:prstGeom>
+            <a:ln w="15875">
+              <a:solidFill>
+                <a:srgbClr val="0000FF"/>
+              </a:solidFill>
+              <a:headEnd type="triangle" w="sm" len="med"/>
+            </a:ln>
+          </p:spPr>
+          <p:style>
+            <a:lnRef idx="1">
+              <a:schemeClr val="accent1"/>
+            </a:lnRef>
+            <a:fillRef idx="0">
+              <a:schemeClr val="accent1"/>
+            </a:fillRef>
+            <a:effectRef idx="0">
+              <a:schemeClr val="accent1"/>
+            </a:effectRef>
+            <a:fontRef idx="minor">
+              <a:schemeClr val="tx1"/>
+            </a:fontRef>
+          </p:style>
+          <p:txBody>
+            <a:bodyPr rtlCol="0" anchor="ctr"/>
+            <a:lstStyle/>
+            <a:p>
+              <a:pPr algn="ctr"/>
+              <a:endParaRPr lang="LID4096"/>
+            </a:p>
+          </p:txBody>
+        </p:sp>
+        <p:sp>
+          <p:nvSpPr>
+            <p:cNvPr id="18" name="TextBox 17">
+              <a:extLst>
+                <a:ext uri="{FF2B5EF4-FFF2-40B4-BE49-F238E27FC236}">
+                  <a16:creationId xmlns:a16="http://schemas.microsoft.com/office/drawing/2014/main" id="{5D307E96-806C-04B6-17F2-D54772C5AF7F}"/>
                 </a:ext>
               </a:extLst>
             </p:cNvPr>
@@ -3542,8 +4613,8 @@
           </p:nvSpPr>
           <p:spPr>
             <a:xfrm>
-              <a:off x="5471424" y="2550414"/>
-              <a:ext cx="292068" cy="338554"/>
+              <a:off x="8807487" y="3275111"/>
+              <a:ext cx="985013" cy="307777"/>
             </a:xfrm>
             <a:prstGeom prst="rect">
               <a:avLst/>
@@ -3557,384 +4628,328 @@
             <a:lstStyle/>
             <a:p>
               <a:r>
-                <a:rPr lang="en-US" sz="1600" b="1" dirty="0">
+                <a:rPr lang="en-US" sz="1400" dirty="0">
                   <a:solidFill>
-                    <a:srgbClr val="00FF00"/>
+                    <a:srgbClr val="0000FF"/>
                   </a:solidFill>
                 </a:rPr>
-                <a:t>Y</a:t>
+                <a:t>‘</a:t>
               </a:r>
+              <a:r>
+                <a:rPr lang="en-US" sz="1400" dirty="0" err="1">
+                  <a:solidFill>
+                    <a:srgbClr val="0000FF"/>
+                  </a:solidFill>
+                </a:rPr>
+                <a:t>Coord_Rx</a:t>
+              </a:r>
+              <a:r>
+                <a:rPr lang="en-US" sz="1400" dirty="0">
+                  <a:solidFill>
+                    <a:srgbClr val="0000FF"/>
+                  </a:solidFill>
+                </a:rPr>
+                <a:t>’</a:t>
+              </a:r>
+              <a:endParaRPr lang="LID4096" sz="1400" dirty="0">
+                <a:solidFill>
+                  <a:srgbClr val="0000FF"/>
+                </a:solidFill>
+              </a:endParaRPr>
+            </a:p>
+          </p:txBody>
+        </p:sp>
+        <p:sp>
+          <p:nvSpPr>
+            <p:cNvPr id="19" name="Arc 18">
+              <a:extLst>
+                <a:ext uri="{FF2B5EF4-FFF2-40B4-BE49-F238E27FC236}">
+                  <a16:creationId xmlns:a16="http://schemas.microsoft.com/office/drawing/2014/main" id="{EB175A46-CED3-2610-20D9-AEF755666C35}"/>
+                </a:ext>
+              </a:extLst>
+            </p:cNvPr>
+            <p:cNvSpPr/>
+            <p:nvPr/>
+          </p:nvSpPr>
+          <p:spPr>
+            <a:xfrm rot="20528753">
+              <a:off x="8665344" y="2984538"/>
+              <a:ext cx="614933" cy="1129387"/>
+            </a:xfrm>
+            <a:prstGeom prst="arc">
+              <a:avLst>
+                <a:gd name="adj1" fmla="val 17045100"/>
+                <a:gd name="adj2" fmla="val 19962129"/>
+              </a:avLst>
+            </a:prstGeom>
+            <a:ln w="15875">
+              <a:solidFill>
+                <a:srgbClr val="0000FF"/>
+              </a:solidFill>
+              <a:headEnd type="triangle" w="sm" len="med"/>
+            </a:ln>
+          </p:spPr>
+          <p:style>
+            <a:lnRef idx="1">
+              <a:schemeClr val="accent1"/>
+            </a:lnRef>
+            <a:fillRef idx="0">
+              <a:schemeClr val="accent1"/>
+            </a:fillRef>
+            <a:effectRef idx="0">
+              <a:schemeClr val="accent1"/>
+            </a:effectRef>
+            <a:fontRef idx="minor">
+              <a:schemeClr val="tx1"/>
+            </a:fontRef>
+          </p:style>
+          <p:txBody>
+            <a:bodyPr rtlCol="0" anchor="ctr"/>
+            <a:lstStyle/>
+            <a:p>
+              <a:pPr algn="ctr"/>
+              <a:endParaRPr lang="LID4096"/>
+            </a:p>
+          </p:txBody>
+        </p:sp>
+        <p:sp>
+          <p:nvSpPr>
+            <p:cNvPr id="20" name="TextBox 19">
+              <a:extLst>
+                <a:ext uri="{FF2B5EF4-FFF2-40B4-BE49-F238E27FC236}">
+                  <a16:creationId xmlns:a16="http://schemas.microsoft.com/office/drawing/2014/main" id="{3152B21C-C313-1A42-1CB5-4BF275E5DF82}"/>
+                </a:ext>
+              </a:extLst>
+            </p:cNvPr>
+            <p:cNvSpPr txBox="1"/>
+            <p:nvPr/>
+          </p:nvSpPr>
+          <p:spPr>
+            <a:xfrm>
+              <a:off x="5275063" y="3452533"/>
+              <a:ext cx="1248227" cy="307777"/>
+            </a:xfrm>
+            <a:prstGeom prst="rect">
+              <a:avLst/>
+            </a:prstGeom>
+            <a:noFill/>
+          </p:spPr>
+          <p:txBody>
+            <a:bodyPr wrap="none" rtlCol="0">
+              <a:spAutoFit/>
+            </a:bodyPr>
+            <a:lstStyle/>
+            <a:p>
+              <a:r>
+                <a:rPr lang="en-US" sz="1400" dirty="0">
+                  <a:solidFill>
+                    <a:srgbClr val="0000FF"/>
+                  </a:solidFill>
+                </a:rPr>
+                <a:t>‘</a:t>
+              </a:r>
+              <a:r>
+                <a:rPr lang="en-US" sz="1400" dirty="0" err="1">
+                  <a:solidFill>
+                    <a:srgbClr val="0000FF"/>
+                  </a:solidFill>
+                </a:rPr>
+                <a:t>Coord_global</a:t>
+              </a:r>
+              <a:r>
+                <a:rPr lang="en-US" sz="1400" dirty="0">
+                  <a:solidFill>
+                    <a:srgbClr val="0000FF"/>
+                  </a:solidFill>
+                </a:rPr>
+                <a:t>’</a:t>
+              </a:r>
+              <a:endParaRPr lang="LID4096" sz="1400" dirty="0">
+                <a:solidFill>
+                  <a:srgbClr val="0000FF"/>
+                </a:solidFill>
+              </a:endParaRPr>
+            </a:p>
+          </p:txBody>
+        </p:sp>
+        <p:sp>
+          <p:nvSpPr>
+            <p:cNvPr id="21" name="Arc 20">
+              <a:extLst>
+                <a:ext uri="{FF2B5EF4-FFF2-40B4-BE49-F238E27FC236}">
+                  <a16:creationId xmlns:a16="http://schemas.microsoft.com/office/drawing/2014/main" id="{40589177-E236-B66B-84EB-492202C1F54E}"/>
+                </a:ext>
+              </a:extLst>
+            </p:cNvPr>
+            <p:cNvSpPr/>
+            <p:nvPr/>
+          </p:nvSpPr>
+          <p:spPr>
+            <a:xfrm rot="20528753">
+              <a:off x="5028038" y="3088619"/>
+              <a:ext cx="614933" cy="1129387"/>
+            </a:xfrm>
+            <a:prstGeom prst="arc">
+              <a:avLst>
+                <a:gd name="adj1" fmla="val 17045100"/>
+                <a:gd name="adj2" fmla="val 19962129"/>
+              </a:avLst>
+            </a:prstGeom>
+            <a:ln w="15875">
+              <a:solidFill>
+                <a:srgbClr val="0000FF"/>
+              </a:solidFill>
+              <a:headEnd type="triangle" w="sm" len="med"/>
+            </a:ln>
+          </p:spPr>
+          <p:style>
+            <a:lnRef idx="1">
+              <a:schemeClr val="accent1"/>
+            </a:lnRef>
+            <a:fillRef idx="0">
+              <a:schemeClr val="accent1"/>
+            </a:fillRef>
+            <a:effectRef idx="0">
+              <a:schemeClr val="accent1"/>
+            </a:effectRef>
+            <a:fontRef idx="minor">
+              <a:schemeClr val="tx1"/>
+            </a:fontRef>
+          </p:style>
+          <p:txBody>
+            <a:bodyPr rtlCol="0" anchor="ctr"/>
+            <a:lstStyle/>
+            <a:p>
+              <a:pPr algn="ctr"/>
+              <a:endParaRPr lang="LID4096"/>
+            </a:p>
+          </p:txBody>
+        </p:sp>
+        <p:sp>
+          <p:nvSpPr>
+            <p:cNvPr id="22" name="TextBox 21">
+              <a:extLst>
+                <a:ext uri="{FF2B5EF4-FFF2-40B4-BE49-F238E27FC236}">
+                  <a16:creationId xmlns:a16="http://schemas.microsoft.com/office/drawing/2014/main" id="{0D34BB87-F422-EC86-F769-C3459C0051B7}"/>
+                </a:ext>
+              </a:extLst>
+            </p:cNvPr>
+            <p:cNvSpPr txBox="1"/>
+            <p:nvPr/>
+          </p:nvSpPr>
+          <p:spPr>
+            <a:xfrm>
+              <a:off x="4166123" y="1986557"/>
+              <a:ext cx="1129733" cy="307777"/>
+            </a:xfrm>
+            <a:prstGeom prst="rect">
+              <a:avLst/>
+            </a:prstGeom>
+            <a:noFill/>
+          </p:spPr>
+          <p:txBody>
+            <a:bodyPr wrap="none" rtlCol="0">
+              <a:spAutoFit/>
+            </a:bodyPr>
+            <a:lstStyle/>
+            <a:p>
+              <a:r>
+                <a:rPr lang="en-US" sz="1400" dirty="0">
+                  <a:solidFill>
+                    <a:srgbClr val="0000FF"/>
+                  </a:solidFill>
+                </a:rPr>
+                <a:t>‘</a:t>
+              </a:r>
+              <a:r>
+                <a:rPr lang="en-US" sz="1400" dirty="0" err="1">
+                  <a:solidFill>
+                    <a:srgbClr val="0000FF"/>
+                  </a:solidFill>
+                </a:rPr>
+                <a:t>Coord_scan</a:t>
+              </a:r>
+              <a:r>
+                <a:rPr lang="en-US" sz="1400" dirty="0">
+                  <a:solidFill>
+                    <a:srgbClr val="0000FF"/>
+                  </a:solidFill>
+                </a:rPr>
+                <a:t>’</a:t>
+              </a:r>
+              <a:endParaRPr lang="LID4096" sz="1400" dirty="0">
+                <a:solidFill>
+                  <a:srgbClr val="0000FF"/>
+                </a:solidFill>
+              </a:endParaRPr>
             </a:p>
           </p:txBody>
         </p:sp>
       </p:grpSp>
-      <p:cxnSp>
-        <p:nvCxnSpPr>
-          <p:cNvPr id="46" name="Straight Arrow Connector 45">
-            <a:extLst>
-              <a:ext uri="{FF2B5EF4-FFF2-40B4-BE49-F238E27FC236}">
-                <a16:creationId xmlns:a16="http://schemas.microsoft.com/office/drawing/2014/main" id="{7F0DAB42-932C-48BC-9B62-1240B73D6D44}"/>
-              </a:ext>
-            </a:extLst>
-          </p:cNvPr>
-          <p:cNvCxnSpPr>
-            <a:cxnSpLocks/>
-          </p:cNvCxnSpPr>
+    </p:spTree>
+    <p:extLst>
+      <p:ext uri="{BB962C8B-B14F-4D97-AF65-F5344CB8AC3E}">
+        <p14:creationId xmlns:p14="http://schemas.microsoft.com/office/powerpoint/2010/main" val="1524046547"/>
+      </p:ext>
+    </p:extLst>
+  </p:cSld>
+  <p:clrMapOvr>
+    <a:masterClrMapping/>
+  </p:clrMapOvr>
+</p:sld>
+</file>
+
+<file path=ppt/slides/slide2.xml><?xml version="1.0" encoding="utf-8"?>
+<p:sld xmlns:a="http://schemas.openxmlformats.org/drawingml/2006/main" xmlns:r="http://schemas.openxmlformats.org/officeDocument/2006/relationships" xmlns:p="http://schemas.openxmlformats.org/presentationml/2006/main">
+  <p:cSld>
+    <p:spTree>
+      <p:nvGrpSpPr>
+        <p:cNvPr id="1" name=""/>
+        <p:cNvGrpSpPr/>
+        <p:nvPr/>
+      </p:nvGrpSpPr>
+      <p:grpSpPr>
+        <a:xfrm>
+          <a:off x="0" y="0"/>
+          <a:ext cx="0" cy="0"/>
+          <a:chOff x="0" y="0"/>
+          <a:chExt cx="0" cy="0"/>
+        </a:xfrm>
+      </p:grpSpPr>
+      <p:pic>
+        <p:nvPicPr>
+          <p:cNvPr id="53" name="Picture 52">
+            <a:extLst>
+              <a:ext uri="{FF2B5EF4-FFF2-40B4-BE49-F238E27FC236}">
+                <a16:creationId xmlns:a16="http://schemas.microsoft.com/office/drawing/2014/main" id="{4DE5D549-7C88-8CC5-9E12-4433513DF041}"/>
+              </a:ext>
+            </a:extLst>
+          </p:cNvPr>
+          <p:cNvPicPr>
+            <a:picLocks noChangeAspect="1"/>
+          </p:cNvPicPr>
           <p:nvPr/>
-        </p:nvCxnSpPr>
+        </p:nvPicPr>
+        <p:blipFill>
+          <a:blip r:embed="rId2"/>
+          <a:stretch>
+            <a:fillRect/>
+          </a:stretch>
+        </p:blipFill>
         <p:spPr>
           <a:xfrm>
-            <a:off x="2882900" y="2921000"/>
-            <a:ext cx="6019800" cy="0"/>
-          </a:xfrm>
-          <a:prstGeom prst="straightConnector1">
-            <a:avLst/>
-          </a:prstGeom>
-          <a:ln w="15875">
-            <a:solidFill>
-              <a:srgbClr val="0000FF"/>
-            </a:solidFill>
-            <a:headEnd type="triangle" w="lg" len="med"/>
-            <a:tailEnd type="triangle" w="lg" len="med"/>
-          </a:ln>
-        </p:spPr>
-        <p:style>
-          <a:lnRef idx="1">
-            <a:schemeClr val="accent1"/>
-          </a:lnRef>
-          <a:fillRef idx="0">
-            <a:schemeClr val="accent1"/>
-          </a:fillRef>
-          <a:effectRef idx="0">
-            <a:schemeClr val="accent1"/>
-          </a:effectRef>
-          <a:fontRef idx="minor">
-            <a:schemeClr val="tx1"/>
-          </a:fontRef>
-        </p:style>
-      </p:cxnSp>
-      <p:sp>
-        <p:nvSpPr>
-          <p:cNvPr id="48" name="TextBox 47">
-            <a:extLst>
-              <a:ext uri="{FF2B5EF4-FFF2-40B4-BE49-F238E27FC236}">
-                <a16:creationId xmlns:a16="http://schemas.microsoft.com/office/drawing/2014/main" id="{BF85D73A-672A-BE3D-C65B-43AA7C63131E}"/>
-              </a:ext>
-            </a:extLst>
-          </p:cNvPr>
-          <p:cNvSpPr txBox="1"/>
-          <p:nvPr/>
-        </p:nvSpPr>
-        <p:spPr>
-          <a:xfrm>
-            <a:off x="6290558" y="3028890"/>
-            <a:ext cx="396262" cy="400110"/>
+            <a:off x="789431" y="0"/>
+            <a:ext cx="10613137" cy="6858000"/>
           </a:xfrm>
           <a:prstGeom prst="rect">
             <a:avLst/>
           </a:prstGeom>
-          <a:noFill/>
         </p:spPr>
-        <p:txBody>
-          <a:bodyPr wrap="none" rtlCol="0">
-            <a:spAutoFit/>
-          </a:bodyPr>
-          <a:lstStyle/>
-          <a:p>
-            <a:r>
-              <a:rPr lang="en-US" sz="2000" b="1" dirty="0">
-                <a:solidFill>
-                  <a:srgbClr val="0000FF"/>
-                </a:solidFill>
-              </a:rPr>
-              <a:t>Ls</a:t>
-            </a:r>
-          </a:p>
-        </p:txBody>
-      </p:sp>
-      <p:sp>
-        <p:nvSpPr>
-          <p:cNvPr id="50" name="TextBox 49">
-            <a:extLst>
-              <a:ext uri="{FF2B5EF4-FFF2-40B4-BE49-F238E27FC236}">
-                <a16:creationId xmlns:a16="http://schemas.microsoft.com/office/drawing/2014/main" id="{B6E12478-C667-F9C8-0BB7-28E8BFC50FB4}"/>
-              </a:ext>
-            </a:extLst>
-          </p:cNvPr>
-          <p:cNvSpPr txBox="1"/>
-          <p:nvPr/>
-        </p:nvSpPr>
-        <p:spPr>
-          <a:xfrm>
-            <a:off x="3620806" y="3740090"/>
-            <a:ext cx="502061" cy="400110"/>
-          </a:xfrm>
-          <a:prstGeom prst="rect">
-            <a:avLst/>
-          </a:prstGeom>
-          <a:noFill/>
-        </p:spPr>
-        <p:txBody>
-          <a:bodyPr wrap="none" rtlCol="0">
-            <a:spAutoFit/>
-          </a:bodyPr>
-          <a:lstStyle/>
-          <a:p>
-            <a:r>
-              <a:rPr lang="en-US" sz="2000" b="1" dirty="0" err="1">
-                <a:solidFill>
-                  <a:srgbClr val="0000FF"/>
-                </a:solidFill>
-              </a:rPr>
-              <a:t>Lm</a:t>
-            </a:r>
-            <a:endParaRPr lang="en-US" sz="2000" b="1" dirty="0">
-              <a:solidFill>
-                <a:srgbClr val="0000FF"/>
-              </a:solidFill>
-            </a:endParaRPr>
-          </a:p>
-        </p:txBody>
-      </p:sp>
-      <mc:AlternateContent xmlns:mc="http://schemas.openxmlformats.org/markup-compatibility/2006">
-        <mc:Choice xmlns:a14="http://schemas.microsoft.com/office/drawing/2010/main" Requires="a14">
-          <p:sp>
-            <p:nvSpPr>
-              <p:cNvPr id="52" name="TextBox 51">
-                <a:extLst>
-                  <a:ext uri="{FF2B5EF4-FFF2-40B4-BE49-F238E27FC236}">
-                    <a16:creationId xmlns:a16="http://schemas.microsoft.com/office/drawing/2014/main" id="{F57D5C52-6510-B352-F138-695ADA0C5683}"/>
-                  </a:ext>
-                </a:extLst>
-              </p:cNvPr>
-              <p:cNvSpPr txBox="1"/>
-              <p:nvPr/>
-            </p:nvSpPr>
-            <p:spPr>
-              <a:xfrm>
-                <a:off x="4670131" y="3429000"/>
-                <a:ext cx="682110" cy="338554"/>
-              </a:xfrm>
-              <a:prstGeom prst="rect">
-                <a:avLst/>
-              </a:prstGeom>
-              <a:noFill/>
-            </p:spPr>
-            <p:txBody>
-              <a:bodyPr wrap="none" rtlCol="0">
-                <a:spAutoFit/>
-              </a:bodyPr>
-              <a:lstStyle/>
-              <a:p>
-                <a14:m>
-                  <m:oMathPara xmlns:m="http://schemas.openxmlformats.org/officeDocument/2006/math">
-                    <m:oMathParaPr>
-                      <m:jc m:val="centerGroup"/>
-                    </m:oMathParaPr>
-                    <m:oMath xmlns:m="http://schemas.openxmlformats.org/officeDocument/2006/math">
-                      <m:sSub>
-                        <m:sSubPr>
-                          <m:ctrlPr>
-                            <a:rPr lang="en-US" sz="1600" b="1" i="1" smtClean="0">
-                              <a:solidFill>
-                                <a:srgbClr val="0000FF"/>
-                              </a:solidFill>
-                              <a:latin typeface="Cambria Math" panose="02040503050406030204" pitchFamily="18" charset="0"/>
-                            </a:rPr>
-                          </m:ctrlPr>
-                        </m:sSubPr>
-                        <m:e>
-                          <m:r>
-                            <a:rPr lang="en-US" sz="1600" b="1" i="1" smtClean="0">
-                              <a:solidFill>
-                                <a:srgbClr val="0000FF"/>
-                              </a:solidFill>
-                              <a:latin typeface="Cambria Math" panose="02040503050406030204" pitchFamily="18" charset="0"/>
-                            </a:rPr>
-                            <m:t>𝜽</m:t>
-                          </m:r>
-                        </m:e>
-                        <m:sub>
-                          <m:r>
-                            <a:rPr lang="en-US" sz="1600" b="1" i="1" smtClean="0">
-                              <a:solidFill>
-                                <a:srgbClr val="0000FF"/>
-                              </a:solidFill>
-                              <a:latin typeface="Cambria Math" panose="02040503050406030204" pitchFamily="18" charset="0"/>
-                            </a:rPr>
-                            <m:t>𝟎</m:t>
-                          </m:r>
-                        </m:sub>
-                      </m:sSub>
-                      <m:r>
-                        <a:rPr lang="en-US" sz="1600" b="1" i="1" smtClean="0">
-                          <a:solidFill>
-                            <a:srgbClr val="0000FF"/>
-                          </a:solidFill>
-                          <a:latin typeface="Cambria Math" panose="02040503050406030204" pitchFamily="18" charset="0"/>
-                        </a:rPr>
-                        <m:t>/</m:t>
-                      </m:r>
-                      <m:r>
-                        <a:rPr lang="en-US" sz="1600" b="1" i="1" smtClean="0">
-                          <a:solidFill>
-                            <a:srgbClr val="0000FF"/>
-                          </a:solidFill>
-                          <a:latin typeface="Cambria Math" panose="02040503050406030204" pitchFamily="18" charset="0"/>
-                        </a:rPr>
-                        <m:t>𝟐</m:t>
-                      </m:r>
-                    </m:oMath>
-                  </m:oMathPara>
-                </a14:m>
-                <a:endParaRPr lang="en-US" sz="1600" b="1" dirty="0">
-                  <a:solidFill>
-                    <a:srgbClr val="0000FF"/>
-                  </a:solidFill>
-                </a:endParaRPr>
-              </a:p>
-            </p:txBody>
-          </p:sp>
-        </mc:Choice>
-        <mc:Fallback>
-          <p:sp>
-            <p:nvSpPr>
-              <p:cNvPr id="52" name="TextBox 51">
-                <a:extLst>
-                  <a:ext uri="{FF2B5EF4-FFF2-40B4-BE49-F238E27FC236}">
-                    <a16:creationId xmlns:a16="http://schemas.microsoft.com/office/drawing/2014/main" id="{F57D5C52-6510-B352-F138-695ADA0C5683}"/>
-                  </a:ext>
-                </a:extLst>
-              </p:cNvPr>
-              <p:cNvSpPr txBox="1">
-                <a:spLocks noRot="1" noChangeAspect="1" noMove="1" noResize="1" noEditPoints="1" noAdjustHandles="1" noChangeArrowheads="1" noChangeShapeType="1" noTextEdit="1"/>
-              </p:cNvSpPr>
-              <p:nvPr/>
-            </p:nvSpPr>
-            <p:spPr>
-              <a:xfrm>
-                <a:off x="4670131" y="3429000"/>
-                <a:ext cx="682110" cy="338554"/>
-              </a:xfrm>
-              <a:prstGeom prst="rect">
-                <a:avLst/>
-              </a:prstGeom>
-              <a:blipFill>
-                <a:blip r:embed="rId3"/>
-                <a:stretch>
-                  <a:fillRect b="-9091"/>
-                </a:stretch>
-              </a:blipFill>
-            </p:spPr>
-            <p:txBody>
-              <a:bodyPr/>
-              <a:lstStyle/>
-              <a:p>
-                <a:r>
-                  <a:rPr lang="en-US">
-                    <a:noFill/>
-                  </a:rPr>
-                  <a:t> </a:t>
-                </a:r>
-              </a:p>
-            </p:txBody>
-          </p:sp>
-        </mc:Fallback>
-      </mc:AlternateContent>
-      <p:cxnSp>
-        <p:nvCxnSpPr>
-          <p:cNvPr id="53" name="Straight Arrow Connector 52">
-            <a:extLst>
-              <a:ext uri="{FF2B5EF4-FFF2-40B4-BE49-F238E27FC236}">
-                <a16:creationId xmlns:a16="http://schemas.microsoft.com/office/drawing/2014/main" id="{0B9469CB-8FD0-678C-3BAC-16E12B7EAC83}"/>
-              </a:ext>
-            </a:extLst>
-          </p:cNvPr>
-          <p:cNvCxnSpPr>
-            <a:cxnSpLocks/>
-          </p:cNvCxnSpPr>
-          <p:nvPr/>
-        </p:nvCxnSpPr>
-        <p:spPr>
-          <a:xfrm>
-            <a:off x="2882900" y="2920999"/>
-            <a:ext cx="2404324" cy="1790701"/>
-          </a:xfrm>
-          <a:prstGeom prst="straightConnector1">
-            <a:avLst/>
-          </a:prstGeom>
-          <a:ln w="12700">
-            <a:solidFill>
-              <a:srgbClr val="0000FF"/>
-            </a:solidFill>
-            <a:headEnd type="triangle" w="lg" len="med"/>
-            <a:tailEnd type="triangle" w="lg" len="med"/>
-          </a:ln>
-        </p:spPr>
-        <p:style>
-          <a:lnRef idx="1">
-            <a:schemeClr val="accent1"/>
-          </a:lnRef>
-          <a:fillRef idx="0">
-            <a:schemeClr val="accent1"/>
-          </a:fillRef>
-          <a:effectRef idx="0">
-            <a:schemeClr val="accent1"/>
-          </a:effectRef>
-          <a:fontRef idx="minor">
-            <a:schemeClr val="tx1"/>
-          </a:fontRef>
-        </p:style>
-      </p:cxnSp>
-      <p:cxnSp>
-        <p:nvCxnSpPr>
-          <p:cNvPr id="58" name="Straight Connector 57">
-            <a:extLst>
-              <a:ext uri="{FF2B5EF4-FFF2-40B4-BE49-F238E27FC236}">
-                <a16:creationId xmlns:a16="http://schemas.microsoft.com/office/drawing/2014/main" id="{84CBB8B1-DA40-C6F5-ACE7-9FBD4749732B}"/>
-              </a:ext>
-            </a:extLst>
-          </p:cNvPr>
-          <p:cNvCxnSpPr>
-            <a:cxnSpLocks/>
-          </p:cNvCxnSpPr>
-          <p:nvPr/>
-        </p:nvCxnSpPr>
-        <p:spPr>
-          <a:xfrm flipV="1">
-            <a:off x="4822825" y="3705657"/>
-            <a:ext cx="464399" cy="110692"/>
-          </a:xfrm>
-          <a:prstGeom prst="line">
-            <a:avLst/>
-          </a:prstGeom>
-          <a:ln w="38100">
-            <a:solidFill>
-              <a:srgbClr val="0000FF"/>
-            </a:solidFill>
-            <a:headEnd type="stealth"/>
-            <a:tailEnd type="stealth"/>
-          </a:ln>
-        </p:spPr>
-        <p:style>
-          <a:lnRef idx="1">
-            <a:schemeClr val="accent1"/>
-          </a:lnRef>
-          <a:fillRef idx="0">
-            <a:schemeClr val="accent1"/>
-          </a:fillRef>
-          <a:effectRef idx="0">
-            <a:schemeClr val="accent1"/>
-          </a:effectRef>
-          <a:fontRef idx="minor">
-            <a:schemeClr val="tx1"/>
-          </a:fontRef>
-        </p:style>
-      </p:cxnSp>
+      </p:pic>
     </p:spTree>
     <p:extLst>
       <p:ext uri="{BB962C8B-B14F-4D97-AF65-F5344CB8AC3E}">
-        <p14:creationId xmlns:p14="http://schemas.microsoft.com/office/powerpoint/2010/main" val="1524046547"/>
+        <p14:creationId xmlns:p14="http://schemas.microsoft.com/office/powerpoint/2010/main" val="3580349888"/>
       </p:ext>
     </p:extLst>
   </p:cSld>
@@ -4237,4 +5252,299 @@
     </a:ext>
   </a:extLst>
 </a:theme>
+</file>
+
+<file path=ppt/theme/theme2.xml><?xml version="1.0" encoding="utf-8"?>
+<a:theme xmlns:a="http://schemas.openxmlformats.org/drawingml/2006/main" name="Office Theme">
+  <a:themeElements>
+    <a:clrScheme name="Office">
+      <a:dk1>
+        <a:sysClr val="windowText" lastClr="000000"/>
+      </a:dk1>
+      <a:lt1>
+        <a:sysClr val="window" lastClr="FFFFFF"/>
+      </a:lt1>
+      <a:dk2>
+        <a:srgbClr val="44546A"/>
+      </a:dk2>
+      <a:lt2>
+        <a:srgbClr val="E7E6E6"/>
+      </a:lt2>
+      <a:accent1>
+        <a:srgbClr val="4472C4"/>
+      </a:accent1>
+      <a:accent2>
+        <a:srgbClr val="ED7D31"/>
+      </a:accent2>
+      <a:accent3>
+        <a:srgbClr val="A5A5A5"/>
+      </a:accent3>
+      <a:accent4>
+        <a:srgbClr val="FFC000"/>
+      </a:accent4>
+      <a:accent5>
+        <a:srgbClr val="5B9BD5"/>
+      </a:accent5>
+      <a:accent6>
+        <a:srgbClr val="70AD47"/>
+      </a:accent6>
+      <a:hlink>
+        <a:srgbClr val="0563C1"/>
+      </a:hlink>
+      <a:folHlink>
+        <a:srgbClr val="954F72"/>
+      </a:folHlink>
+    </a:clrScheme>
+    <a:fontScheme name="Office">
+      <a:majorFont>
+        <a:latin typeface="Calibri Light" panose="020F0302020204030204"/>
+        <a:ea typeface=""/>
+        <a:cs typeface=""/>
+        <a:font script="Jpan" typeface="游ゴシック Light"/>
+        <a:font script="Hang" typeface="맑은 고딕"/>
+        <a:font script="Hans" typeface="等线 Light"/>
+        <a:font script="Hant" typeface="新細明體"/>
+        <a:font script="Arab" typeface="Times New Roman"/>
+        <a:font script="Hebr" typeface="Times New Roman"/>
+        <a:font script="Thai" typeface="Angsana New"/>
+        <a:font script="Ethi" typeface="Nyala"/>
+        <a:font script="Beng" typeface="Vrinda"/>
+        <a:font script="Gujr" typeface="Shruti"/>
+        <a:font script="Khmr" typeface="MoolBoran"/>
+        <a:font script="Knda" typeface="Tunga"/>
+        <a:font script="Guru" typeface="Raavi"/>
+        <a:font script="Cans" typeface="Euphemia"/>
+        <a:font script="Cher" typeface="Plantagenet Cherokee"/>
+        <a:font script="Yiii" typeface="Microsoft Yi Baiti"/>
+        <a:font script="Tibt" typeface="Microsoft Himalaya"/>
+        <a:font script="Thaa" typeface="MV Boli"/>
+        <a:font script="Deva" typeface="Mangal"/>
+        <a:font script="Telu" typeface="Gautami"/>
+        <a:font script="Taml" typeface="Latha"/>
+        <a:font script="Syrc" typeface="Estrangelo Edessa"/>
+        <a:font script="Orya" typeface="Kalinga"/>
+        <a:font script="Mlym" typeface="Kartika"/>
+        <a:font script="Laoo" typeface="DokChampa"/>
+        <a:font script="Sinh" typeface="Iskoola Pota"/>
+        <a:font script="Mong" typeface="Mongolian Baiti"/>
+        <a:font script="Viet" typeface="Times New Roman"/>
+        <a:font script="Uigh" typeface="Microsoft Uighur"/>
+        <a:font script="Geor" typeface="Sylfaen"/>
+        <a:font script="Armn" typeface="Arial"/>
+        <a:font script="Bugi" typeface="Leelawadee UI"/>
+        <a:font script="Bopo" typeface="Microsoft JhengHei"/>
+        <a:font script="Java" typeface="Javanese Text"/>
+        <a:font script="Lisu" typeface="Segoe UI"/>
+        <a:font script="Mymr" typeface="Myanmar Text"/>
+        <a:font script="Nkoo" typeface="Ebrima"/>
+        <a:font script="Olck" typeface="Nirmala UI"/>
+        <a:font script="Osma" typeface="Ebrima"/>
+        <a:font script="Phag" typeface="Phagspa"/>
+        <a:font script="Syrn" typeface="Estrangelo Edessa"/>
+        <a:font script="Syrj" typeface="Estrangelo Edessa"/>
+        <a:font script="Syre" typeface="Estrangelo Edessa"/>
+        <a:font script="Sora" typeface="Nirmala UI"/>
+        <a:font script="Tale" typeface="Microsoft Tai Le"/>
+        <a:font script="Talu" typeface="Microsoft New Tai Lue"/>
+        <a:font script="Tfng" typeface="Ebrima"/>
+      </a:majorFont>
+      <a:minorFont>
+        <a:latin typeface="Calibri" panose="020F0502020204030204"/>
+        <a:ea typeface=""/>
+        <a:cs typeface=""/>
+        <a:font script="Jpan" typeface="游ゴシック"/>
+        <a:font script="Hang" typeface="맑은 고딕"/>
+        <a:font script="Hans" typeface="等线"/>
+        <a:font script="Hant" typeface="新細明體"/>
+        <a:font script="Arab" typeface="Arial"/>
+        <a:font script="Hebr" typeface="Arial"/>
+        <a:font script="Thai" typeface="Cordia New"/>
+        <a:font script="Ethi" typeface="Nyala"/>
+        <a:font script="Beng" typeface="Vrinda"/>
+        <a:font script="Gujr" typeface="Shruti"/>
+        <a:font script="Khmr" typeface="DaunPenh"/>
+        <a:font script="Knda" typeface="Tunga"/>
+        <a:font script="Guru" typeface="Raavi"/>
+        <a:font script="Cans" typeface="Euphemia"/>
+        <a:font script="Cher" typeface="Plantagenet Cherokee"/>
+        <a:font script="Yiii" typeface="Microsoft Yi Baiti"/>
+        <a:font script="Tibt" typeface="Microsoft Himalaya"/>
+        <a:font script="Thaa" typeface="MV Boli"/>
+        <a:font script="Deva" typeface="Mangal"/>
+        <a:font script="Telu" typeface="Gautami"/>
+        <a:font script="Taml" typeface="Latha"/>
+        <a:font script="Syrc" typeface="Estrangelo Edessa"/>
+        <a:font script="Orya" typeface="Kalinga"/>
+        <a:font script="Mlym" typeface="Kartika"/>
+        <a:font script="Laoo" typeface="DokChampa"/>
+        <a:font script="Sinh" typeface="Iskoola Pota"/>
+        <a:font script="Mong" typeface="Mongolian Baiti"/>
+        <a:font script="Viet" typeface="Arial"/>
+        <a:font script="Uigh" typeface="Microsoft Uighur"/>
+        <a:font script="Geor" typeface="Sylfaen"/>
+        <a:font script="Armn" typeface="Arial"/>
+        <a:font script="Bugi" typeface="Leelawadee UI"/>
+        <a:font script="Bopo" typeface="Microsoft JhengHei"/>
+        <a:font script="Java" typeface="Javanese Text"/>
+        <a:font script="Lisu" typeface="Segoe UI"/>
+        <a:font script="Mymr" typeface="Myanmar Text"/>
+        <a:font script="Nkoo" typeface="Ebrima"/>
+        <a:font script="Olck" typeface="Nirmala UI"/>
+        <a:font script="Osma" typeface="Ebrima"/>
+        <a:font script="Phag" typeface="Phagspa"/>
+        <a:font script="Syrn" typeface="Estrangelo Edessa"/>
+        <a:font script="Syrj" typeface="Estrangelo Edessa"/>
+        <a:font script="Syre" typeface="Estrangelo Edessa"/>
+        <a:font script="Sora" typeface="Nirmala UI"/>
+        <a:font script="Tale" typeface="Microsoft Tai Le"/>
+        <a:font script="Talu" typeface="Microsoft New Tai Lue"/>
+        <a:font script="Tfng" typeface="Ebrima"/>
+      </a:minorFont>
+    </a:fontScheme>
+    <a:fmtScheme name="Office">
+      <a:fillStyleLst>
+        <a:solidFill>
+          <a:schemeClr val="phClr"/>
+        </a:solidFill>
+        <a:gradFill rotWithShape="1">
+          <a:gsLst>
+            <a:gs pos="0">
+              <a:schemeClr val="phClr">
+                <a:lumMod val="110000"/>
+                <a:satMod val="105000"/>
+                <a:tint val="67000"/>
+              </a:schemeClr>
+            </a:gs>
+            <a:gs pos="50000">
+              <a:schemeClr val="phClr">
+                <a:lumMod val="105000"/>
+                <a:satMod val="103000"/>
+                <a:tint val="73000"/>
+              </a:schemeClr>
+            </a:gs>
+            <a:gs pos="100000">
+              <a:schemeClr val="phClr">
+                <a:lumMod val="105000"/>
+                <a:satMod val="109000"/>
+                <a:tint val="81000"/>
+              </a:schemeClr>
+            </a:gs>
+          </a:gsLst>
+          <a:lin ang="5400000" scaled="0"/>
+        </a:gradFill>
+        <a:gradFill rotWithShape="1">
+          <a:gsLst>
+            <a:gs pos="0">
+              <a:schemeClr val="phClr">
+                <a:satMod val="103000"/>
+                <a:lumMod val="102000"/>
+                <a:tint val="94000"/>
+              </a:schemeClr>
+            </a:gs>
+            <a:gs pos="50000">
+              <a:schemeClr val="phClr">
+                <a:satMod val="110000"/>
+                <a:lumMod val="100000"/>
+                <a:shade val="100000"/>
+              </a:schemeClr>
+            </a:gs>
+            <a:gs pos="100000">
+              <a:schemeClr val="phClr">
+                <a:lumMod val="99000"/>
+                <a:satMod val="120000"/>
+                <a:shade val="78000"/>
+              </a:schemeClr>
+            </a:gs>
+          </a:gsLst>
+          <a:lin ang="5400000" scaled="0"/>
+        </a:gradFill>
+      </a:fillStyleLst>
+      <a:lnStyleLst>
+        <a:ln w="6350" cap="flat" cmpd="sng" algn="ctr">
+          <a:solidFill>
+            <a:schemeClr val="phClr"/>
+          </a:solidFill>
+          <a:prstDash val="solid"/>
+          <a:miter lim="800000"/>
+        </a:ln>
+        <a:ln w="12700" cap="flat" cmpd="sng" algn="ctr">
+          <a:solidFill>
+            <a:schemeClr val="phClr"/>
+          </a:solidFill>
+          <a:prstDash val="solid"/>
+          <a:miter lim="800000"/>
+        </a:ln>
+        <a:ln w="19050" cap="flat" cmpd="sng" algn="ctr">
+          <a:solidFill>
+            <a:schemeClr val="phClr"/>
+          </a:solidFill>
+          <a:prstDash val="solid"/>
+          <a:miter lim="800000"/>
+        </a:ln>
+      </a:lnStyleLst>
+      <a:effectStyleLst>
+        <a:effectStyle>
+          <a:effectLst/>
+        </a:effectStyle>
+        <a:effectStyle>
+          <a:effectLst/>
+        </a:effectStyle>
+        <a:effectStyle>
+          <a:effectLst>
+            <a:outerShdw blurRad="57150" dist="19050" dir="5400000" algn="ctr" rotWithShape="0">
+              <a:srgbClr val="000000">
+                <a:alpha val="63000"/>
+              </a:srgbClr>
+            </a:outerShdw>
+          </a:effectLst>
+        </a:effectStyle>
+      </a:effectStyleLst>
+      <a:bgFillStyleLst>
+        <a:solidFill>
+          <a:schemeClr val="phClr"/>
+        </a:solidFill>
+        <a:solidFill>
+          <a:schemeClr val="phClr">
+            <a:tint val="95000"/>
+            <a:satMod val="170000"/>
+          </a:schemeClr>
+        </a:solidFill>
+        <a:gradFill rotWithShape="1">
+          <a:gsLst>
+            <a:gs pos="0">
+              <a:schemeClr val="phClr">
+                <a:tint val="93000"/>
+                <a:satMod val="150000"/>
+                <a:shade val="98000"/>
+                <a:lumMod val="102000"/>
+              </a:schemeClr>
+            </a:gs>
+            <a:gs pos="50000">
+              <a:schemeClr val="phClr">
+                <a:tint val="98000"/>
+                <a:satMod val="130000"/>
+                <a:shade val="90000"/>
+                <a:lumMod val="103000"/>
+              </a:schemeClr>
+            </a:gs>
+            <a:gs pos="100000">
+              <a:schemeClr val="phClr">
+                <a:shade val="63000"/>
+                <a:satMod val="120000"/>
+              </a:schemeClr>
+            </a:gs>
+          </a:gsLst>
+          <a:lin ang="5400000" scaled="0"/>
+        </a:gradFill>
+      </a:bgFillStyleLst>
+    </a:fmtScheme>
+  </a:themeElements>
+  <a:objectDefaults/>
+  <a:extraClrSchemeLst/>
+  <a:extLst>
+    <a:ext uri="{05A4C25C-085E-4340-85A3-A5531E510DB2}">
+      <thm15:themeFamily xmlns:thm15="http://schemas.microsoft.com/office/thememl/2012/main" name="Office Theme" id="{62F939B6-93AF-4DB8-9C6B-D6C7DFDC589F}" vid="{4A3C46E8-61CC-4603-A589-7422A47A8E4A}"/>
+    </a:ext>
+  </a:extLst>
+</a:theme>
 </file>
</xml_diff>